<commit_message>
s5 jupyter notebooks files
</commit_message>
<xml_diff>
--- a/s1/1_meeting.pptx
+++ b/s1/1_meeting.pptx
@@ -5,7 +5,7 @@
     <p:sldMasterId id="2147483672" r:id="rId1"/>
   </p:sldMasterIdLst>
   <p:notesMasterIdLst>
-    <p:notesMasterId r:id="rId23"/>
+    <p:notesMasterId r:id="rId26"/>
   </p:notesMasterIdLst>
   <p:sldIdLst>
     <p:sldId id="268" r:id="rId2"/>
@@ -15,20 +15,23 @@
     <p:sldId id="288" r:id="rId6"/>
     <p:sldId id="290" r:id="rId7"/>
     <p:sldId id="300" r:id="rId8"/>
-    <p:sldId id="305" r:id="rId9"/>
-    <p:sldId id="311" r:id="rId10"/>
-    <p:sldId id="291" r:id="rId11"/>
-    <p:sldId id="299" r:id="rId12"/>
-    <p:sldId id="293" r:id="rId13"/>
-    <p:sldId id="297" r:id="rId14"/>
-    <p:sldId id="306" r:id="rId15"/>
-    <p:sldId id="296" r:id="rId16"/>
-    <p:sldId id="310" r:id="rId17"/>
-    <p:sldId id="307" r:id="rId18"/>
-    <p:sldId id="308" r:id="rId19"/>
-    <p:sldId id="301" r:id="rId20"/>
-    <p:sldId id="285" r:id="rId21"/>
-    <p:sldId id="281" r:id="rId22"/>
+    <p:sldId id="312" r:id="rId9"/>
+    <p:sldId id="305" r:id="rId10"/>
+    <p:sldId id="313" r:id="rId11"/>
+    <p:sldId id="311" r:id="rId12"/>
+    <p:sldId id="291" r:id="rId13"/>
+    <p:sldId id="299" r:id="rId14"/>
+    <p:sldId id="293" r:id="rId15"/>
+    <p:sldId id="314" r:id="rId16"/>
+    <p:sldId id="297" r:id="rId17"/>
+    <p:sldId id="306" r:id="rId18"/>
+    <p:sldId id="296" r:id="rId19"/>
+    <p:sldId id="310" r:id="rId20"/>
+    <p:sldId id="307" r:id="rId21"/>
+    <p:sldId id="308" r:id="rId22"/>
+    <p:sldId id="301" r:id="rId23"/>
+    <p:sldId id="285" r:id="rId24"/>
+    <p:sldId id="281" r:id="rId25"/>
   </p:sldIdLst>
   <p:sldSz cx="12192000" cy="6858000"/>
   <p:notesSz cx="6858000" cy="9144000"/>
@@ -2827,6 +2830,46 @@
     </pc:docChg>
   </pc:docChgLst>
   <pc:docChgLst>
+    <pc:chgData name="Lisa Fretschel" userId="S::lisa.fretschel@student.pk.edu.pl::abaaee10-7fa8-4a55-9538-903ecfe0c51a" providerId="AD" clId="Web-{3A5663C4-3DAD-2A70-34E1-8464C544EBF1}"/>
+    <pc:docChg chg="modSld">
+      <pc:chgData name="Lisa Fretschel" userId="S::lisa.fretschel@student.pk.edu.pl::abaaee10-7fa8-4a55-9538-903ecfe0c51a" providerId="AD" clId="Web-{3A5663C4-3DAD-2A70-34E1-8464C544EBF1}" dt="2024-01-21T21:44:16.891" v="2" actId="14100"/>
+      <pc:docMkLst>
+        <pc:docMk/>
+      </pc:docMkLst>
+      <pc:sldChg chg="modSp">
+        <pc:chgData name="Lisa Fretschel" userId="S::lisa.fretschel@student.pk.edu.pl::abaaee10-7fa8-4a55-9538-903ecfe0c51a" providerId="AD" clId="Web-{3A5663C4-3DAD-2A70-34E1-8464C544EBF1}" dt="2024-01-21T21:44:16.891" v="2" actId="14100"/>
+        <pc:sldMkLst>
+          <pc:docMk/>
+          <pc:sldMk cId="1327800918" sldId="279"/>
+        </pc:sldMkLst>
+        <pc:spChg chg="mod">
+          <ac:chgData name="Lisa Fretschel" userId="S::lisa.fretschel@student.pk.edu.pl::abaaee10-7fa8-4a55-9538-903ecfe0c51a" providerId="AD" clId="Web-{3A5663C4-3DAD-2A70-34E1-8464C544EBF1}" dt="2024-01-21T21:44:16.891" v="2" actId="14100"/>
+          <ac:spMkLst>
+            <pc:docMk/>
+            <pc:sldMk cId="1327800918" sldId="279"/>
+            <ac:spMk id="19" creationId="{CF8F4F1D-6B66-DFD6-76B6-F5650CB1B8A5}"/>
+          </ac:spMkLst>
+        </pc:spChg>
+        <pc:spChg chg="mod">
+          <ac:chgData name="Lisa Fretschel" userId="S::lisa.fretschel@student.pk.edu.pl::abaaee10-7fa8-4a55-9538-903ecfe0c51a" providerId="AD" clId="Web-{3A5663C4-3DAD-2A70-34E1-8464C544EBF1}" dt="2024-01-21T21:44:12.938" v="1" actId="14100"/>
+          <ac:spMkLst>
+            <pc:docMk/>
+            <pc:sldMk cId="1327800918" sldId="279"/>
+            <ac:spMk id="21" creationId="{EA8DD162-3861-EC08-7FF3-64031F599686}"/>
+          </ac:spMkLst>
+        </pc:spChg>
+        <pc:spChg chg="mod">
+          <ac:chgData name="Lisa Fretschel" userId="S::lisa.fretschel@student.pk.edu.pl::abaaee10-7fa8-4a55-9538-903ecfe0c51a" providerId="AD" clId="Web-{3A5663C4-3DAD-2A70-34E1-8464C544EBF1}" dt="2024-01-21T21:44:07.031" v="0" actId="14100"/>
+          <ac:spMkLst>
+            <pc:docMk/>
+            <pc:sldMk cId="1327800918" sldId="279"/>
+            <ac:spMk id="30" creationId="{F80852FC-F12F-8534-C490-68CC3485B5CA}"/>
+          </ac:spMkLst>
+        </pc:spChg>
+      </pc:sldChg>
+    </pc:docChg>
+  </pc:docChgLst>
+  <pc:docChgLst>
     <pc:chgData name="Katarzyna Młynarczyk" userId="S::katarzyna.mlynarczyk@student.pk.edu.pl::0899dcc6-7ddc-443b-a5f8-e372dbec5d48" providerId="AD" clId="Web-{92DD319D-B8AE-4DB7-937E-88CCAA9E9A9A}"/>
     <pc:docChg chg="modSld sldOrd">
       <pc:chgData name="Katarzyna Młynarczyk" userId="S::katarzyna.mlynarczyk@student.pk.edu.pl::0899dcc6-7ddc-443b-a5f8-e372dbec5d48" providerId="AD" clId="Web-{92DD319D-B8AE-4DB7-937E-88CCAA9E9A9A}" dt="2024-01-22T22:00:10.978" v="107" actId="1076"/>
@@ -3109,46 +3152,6 @@
             <ac:picMk id="3" creationId="{8091DC61-F0D6-74D5-C451-E5EE1F626F10}"/>
           </ac:picMkLst>
         </pc:picChg>
-      </pc:sldChg>
-    </pc:docChg>
-  </pc:docChgLst>
-  <pc:docChgLst>
-    <pc:chgData name="Lisa Fretschel" userId="S::lisa.fretschel@student.pk.edu.pl::abaaee10-7fa8-4a55-9538-903ecfe0c51a" providerId="AD" clId="Web-{3A5663C4-3DAD-2A70-34E1-8464C544EBF1}"/>
-    <pc:docChg chg="modSld">
-      <pc:chgData name="Lisa Fretschel" userId="S::lisa.fretschel@student.pk.edu.pl::abaaee10-7fa8-4a55-9538-903ecfe0c51a" providerId="AD" clId="Web-{3A5663C4-3DAD-2A70-34E1-8464C544EBF1}" dt="2024-01-21T21:44:16.891" v="2" actId="14100"/>
-      <pc:docMkLst>
-        <pc:docMk/>
-      </pc:docMkLst>
-      <pc:sldChg chg="modSp">
-        <pc:chgData name="Lisa Fretschel" userId="S::lisa.fretschel@student.pk.edu.pl::abaaee10-7fa8-4a55-9538-903ecfe0c51a" providerId="AD" clId="Web-{3A5663C4-3DAD-2A70-34E1-8464C544EBF1}" dt="2024-01-21T21:44:16.891" v="2" actId="14100"/>
-        <pc:sldMkLst>
-          <pc:docMk/>
-          <pc:sldMk cId="1327800918" sldId="279"/>
-        </pc:sldMkLst>
-        <pc:spChg chg="mod">
-          <ac:chgData name="Lisa Fretschel" userId="S::lisa.fretschel@student.pk.edu.pl::abaaee10-7fa8-4a55-9538-903ecfe0c51a" providerId="AD" clId="Web-{3A5663C4-3DAD-2A70-34E1-8464C544EBF1}" dt="2024-01-21T21:44:16.891" v="2" actId="14100"/>
-          <ac:spMkLst>
-            <pc:docMk/>
-            <pc:sldMk cId="1327800918" sldId="279"/>
-            <ac:spMk id="19" creationId="{CF8F4F1D-6B66-DFD6-76B6-F5650CB1B8A5}"/>
-          </ac:spMkLst>
-        </pc:spChg>
-        <pc:spChg chg="mod">
-          <ac:chgData name="Lisa Fretschel" userId="S::lisa.fretschel@student.pk.edu.pl::abaaee10-7fa8-4a55-9538-903ecfe0c51a" providerId="AD" clId="Web-{3A5663C4-3DAD-2A70-34E1-8464C544EBF1}" dt="2024-01-21T21:44:12.938" v="1" actId="14100"/>
-          <ac:spMkLst>
-            <pc:docMk/>
-            <pc:sldMk cId="1327800918" sldId="279"/>
-            <ac:spMk id="21" creationId="{EA8DD162-3861-EC08-7FF3-64031F599686}"/>
-          </ac:spMkLst>
-        </pc:spChg>
-        <pc:spChg chg="mod">
-          <ac:chgData name="Lisa Fretschel" userId="S::lisa.fretschel@student.pk.edu.pl::abaaee10-7fa8-4a55-9538-903ecfe0c51a" providerId="AD" clId="Web-{3A5663C4-3DAD-2A70-34E1-8464C544EBF1}" dt="2024-01-21T21:44:07.031" v="0" actId="14100"/>
-          <ac:spMkLst>
-            <pc:docMk/>
-            <pc:sldMk cId="1327800918" sldId="279"/>
-            <ac:spMk id="30" creationId="{F80852FC-F12F-8534-C490-68CC3485B5CA}"/>
-          </ac:spMkLst>
-        </pc:spChg>
       </pc:sldChg>
     </pc:docChg>
   </pc:docChgLst>
@@ -3710,7 +3713,7 @@
           <a:p>
             <a:fld id="{C77E68A1-D7B2-4F42-8F04-619CCC6E26FF}" type="datetimeFigureOut">
               <a:rPr lang="pl-PL" smtClean="0"/>
-              <a:t>06.03.2024</a:t>
+              <a:t>29.03.2024</a:t>
             </a:fld>
             <a:endParaRPr lang="pl-PL"/>
           </a:p>
@@ -4150,7 +4153,7 @@
           <a:p>
             <a:fld id="{F597B668-CAD6-4823-BEFD-F9D8B79EC711}" type="slidenum">
               <a:rPr lang="pl-PL" smtClean="0"/>
-              <a:t>12</a:t>
+              <a:t>14</a:t>
             </a:fld>
             <a:endParaRPr lang="pl-PL"/>
           </a:p>
@@ -4258,7 +4261,7 @@
           <a:p>
             <a:fld id="{F597B668-CAD6-4823-BEFD-F9D8B79EC711}" type="slidenum">
               <a:rPr lang="pl-PL" smtClean="0"/>
-              <a:t>13</a:t>
+              <a:t>16</a:t>
             </a:fld>
             <a:endParaRPr lang="pl-PL"/>
           </a:p>
@@ -4366,7 +4369,7 @@
           <a:p>
             <a:fld id="{F597B668-CAD6-4823-BEFD-F9D8B79EC711}" type="slidenum">
               <a:rPr lang="pl-PL" smtClean="0"/>
-              <a:t>15</a:t>
+              <a:t>18</a:t>
             </a:fld>
             <a:endParaRPr lang="pl-PL"/>
           </a:p>
@@ -4474,7 +4477,7 @@
           <a:p>
             <a:fld id="{F597B668-CAD6-4823-BEFD-F9D8B79EC711}" type="slidenum">
               <a:rPr lang="pl-PL" smtClean="0"/>
-              <a:t>16</a:t>
+              <a:t>19</a:t>
             </a:fld>
             <a:endParaRPr lang="pl-PL"/>
           </a:p>
@@ -5098,7 +5101,7 @@
           <a:p>
             <a:fld id="{F597B668-CAD6-4823-BEFD-F9D8B79EC711}" type="slidenum">
               <a:rPr lang="pl-PL" smtClean="0"/>
-              <a:t>8</a:t>
+              <a:t>9</a:t>
             </a:fld>
             <a:endParaRPr lang="pl-PL"/>
           </a:p>
@@ -5206,7 +5209,7 @@
           <a:p>
             <a:fld id="{F597B668-CAD6-4823-BEFD-F9D8B79EC711}" type="slidenum">
               <a:rPr lang="pl-PL" smtClean="0"/>
-              <a:t>9</a:t>
+              <a:t>11</a:t>
             </a:fld>
             <a:endParaRPr lang="pl-PL"/>
           </a:p>
@@ -5314,7 +5317,7 @@
           <a:p>
             <a:fld id="{F597B668-CAD6-4823-BEFD-F9D8B79EC711}" type="slidenum">
               <a:rPr lang="pl-PL" smtClean="0"/>
-              <a:t>11</a:t>
+              <a:t>13</a:t>
             </a:fld>
             <a:endParaRPr lang="pl-PL"/>
           </a:p>
@@ -5462,7 +5465,7 @@
           <a:p>
             <a:fld id="{6BF00120-5FD5-4848-8E9F-274DF4A71269}" type="datetimeFigureOut">
               <a:rPr lang="en-GB" smtClean="0"/>
-              <a:t>06/03/2024</a:t>
+              <a:t>29/03/2024</a:t>
             </a:fld>
             <a:endParaRPr lang="en-GB"/>
           </a:p>
@@ -5630,7 +5633,7 @@
           <a:p>
             <a:fld id="{6BF00120-5FD5-4848-8E9F-274DF4A71269}" type="datetimeFigureOut">
               <a:rPr lang="en-GB" smtClean="0"/>
-              <a:t>06/03/2024</a:t>
+              <a:t>29/03/2024</a:t>
             </a:fld>
             <a:endParaRPr lang="en-GB"/>
           </a:p>
@@ -5808,7 +5811,7 @@
           <a:p>
             <a:fld id="{6BF00120-5FD5-4848-8E9F-274DF4A71269}" type="datetimeFigureOut">
               <a:rPr lang="en-GB" smtClean="0"/>
-              <a:t>06/03/2024</a:t>
+              <a:t>29/03/2024</a:t>
             </a:fld>
             <a:endParaRPr lang="en-GB"/>
           </a:p>
@@ -5976,7 +5979,7 @@
           <a:p>
             <a:fld id="{6BF00120-5FD5-4848-8E9F-274DF4A71269}" type="datetimeFigureOut">
               <a:rPr lang="en-GB" smtClean="0"/>
-              <a:t>06/03/2024</a:t>
+              <a:t>29/03/2024</a:t>
             </a:fld>
             <a:endParaRPr lang="en-GB"/>
           </a:p>
@@ -6221,7 +6224,7 @@
           <a:p>
             <a:fld id="{6BF00120-5FD5-4848-8E9F-274DF4A71269}" type="datetimeFigureOut">
               <a:rPr lang="en-GB" smtClean="0"/>
-              <a:t>06/03/2024</a:t>
+              <a:t>29/03/2024</a:t>
             </a:fld>
             <a:endParaRPr lang="en-GB"/>
           </a:p>
@@ -6450,7 +6453,7 @@
           <a:p>
             <a:fld id="{6BF00120-5FD5-4848-8E9F-274DF4A71269}" type="datetimeFigureOut">
               <a:rPr lang="en-GB" smtClean="0"/>
-              <a:t>06/03/2024</a:t>
+              <a:t>29/03/2024</a:t>
             </a:fld>
             <a:endParaRPr lang="en-GB"/>
           </a:p>
@@ -6814,7 +6817,7 @@
           <a:p>
             <a:fld id="{6BF00120-5FD5-4848-8E9F-274DF4A71269}" type="datetimeFigureOut">
               <a:rPr lang="en-GB" smtClean="0"/>
-              <a:t>06/03/2024</a:t>
+              <a:t>29/03/2024</a:t>
             </a:fld>
             <a:endParaRPr lang="en-GB"/>
           </a:p>
@@ -6931,7 +6934,7 @@
           <a:p>
             <a:fld id="{6BF00120-5FD5-4848-8E9F-274DF4A71269}" type="datetimeFigureOut">
               <a:rPr lang="en-GB" smtClean="0"/>
-              <a:t>06/03/2024</a:t>
+              <a:t>29/03/2024</a:t>
             </a:fld>
             <a:endParaRPr lang="en-GB"/>
           </a:p>
@@ -7026,7 +7029,7 @@
           <a:p>
             <a:fld id="{6BF00120-5FD5-4848-8E9F-274DF4A71269}" type="datetimeFigureOut">
               <a:rPr lang="en-GB" smtClean="0"/>
-              <a:t>06/03/2024</a:t>
+              <a:t>29/03/2024</a:t>
             </a:fld>
             <a:endParaRPr lang="en-GB"/>
           </a:p>
@@ -7301,7 +7304,7 @@
           <a:p>
             <a:fld id="{6BF00120-5FD5-4848-8E9F-274DF4A71269}" type="datetimeFigureOut">
               <a:rPr lang="en-GB" smtClean="0"/>
-              <a:t>06/03/2024</a:t>
+              <a:t>29/03/2024</a:t>
             </a:fld>
             <a:endParaRPr lang="en-GB"/>
           </a:p>
@@ -7556,7 +7559,7 @@
           <a:p>
             <a:fld id="{6BF00120-5FD5-4848-8E9F-274DF4A71269}" type="datetimeFigureOut">
               <a:rPr lang="en-GB" smtClean="0"/>
-              <a:t>06/03/2024</a:t>
+              <a:t>29/03/2024</a:t>
             </a:fld>
             <a:endParaRPr lang="en-GB"/>
           </a:p>
@@ -7767,7 +7770,7 @@
           <a:p>
             <a:fld id="{6BF00120-5FD5-4848-8E9F-274DF4A71269}" type="datetimeFigureOut">
               <a:rPr lang="en-GB" smtClean="0"/>
-              <a:t>06/03/2024</a:t>
+              <a:t>29/03/2024</a:t>
             </a:fld>
             <a:endParaRPr lang="en-GB"/>
           </a:p>
@@ -8368,6 +8371,825 @@
           <p:cNvPr id="2" name="Tytuł 1">
             <a:extLst>
               <a:ext uri="{FF2B5EF4-FFF2-40B4-BE49-F238E27FC236}">
+                <a16:creationId xmlns:a16="http://schemas.microsoft.com/office/drawing/2014/main" id="{C4728104-F13E-8585-3068-A9BD51E8DA4A}"/>
+              </a:ext>
+            </a:extLst>
+          </p:cNvPr>
+          <p:cNvSpPr>
+            <a:spLocks noGrp="1"/>
+          </p:cNvSpPr>
+          <p:nvPr>
+            <p:ph type="title"/>
+          </p:nvPr>
+        </p:nvSpPr>
+        <p:spPr>
+          <a:xfrm>
+            <a:off x="2428292" y="2766218"/>
+            <a:ext cx="7335416" cy="1325563"/>
+          </a:xfrm>
+        </p:spPr>
+        <p:txBody>
+          <a:bodyPr/>
+          <a:lstStyle/>
+          <a:p>
+            <a:r>
+              <a:rPr lang="pl-PL" b="1" dirty="0"/>
+              <a:t>Machine Learning </a:t>
+            </a:r>
+            <a:r>
+              <a:rPr lang="pl-PL" b="1" dirty="0" err="1"/>
+              <a:t>Environments</a:t>
+            </a:r>
+            <a:endParaRPr lang="pl-PL" dirty="0"/>
+          </a:p>
+        </p:txBody>
+      </p:sp>
+    </p:spTree>
+    <p:extLst>
+      <p:ext uri="{BB962C8B-B14F-4D97-AF65-F5344CB8AC3E}">
+        <p14:creationId xmlns:p14="http://schemas.microsoft.com/office/powerpoint/2010/main" val="1938414238"/>
+      </p:ext>
+    </p:extLst>
+  </p:cSld>
+  <p:clrMapOvr>
+    <a:masterClrMapping/>
+  </p:clrMapOvr>
+</p:sld>
+</file>
+
+<file path=ppt/slides/slide11.xml><?xml version="1.0" encoding="utf-8"?>
+<p:sld xmlns:a="http://schemas.openxmlformats.org/drawingml/2006/main" xmlns:r="http://schemas.openxmlformats.org/officeDocument/2006/relationships" xmlns:p="http://schemas.openxmlformats.org/presentationml/2006/main">
+  <p:cSld>
+    <p:bg>
+      <p:bgPr>
+        <a:solidFill>
+          <a:schemeClr val="bg1"/>
+        </a:solidFill>
+        <a:effectLst/>
+      </p:bgPr>
+    </p:bg>
+    <p:spTree>
+      <p:nvGrpSpPr>
+        <p:cNvPr id="1" name="">
+          <a:extLst>
+            <a:ext uri="{FF2B5EF4-FFF2-40B4-BE49-F238E27FC236}">
+              <a16:creationId xmlns:a16="http://schemas.microsoft.com/office/drawing/2014/main" id="{37E009D5-DBC0-46EC-BCE5-DE2CF81CF928}"/>
+            </a:ext>
+          </a:extLst>
+        </p:cNvPr>
+        <p:cNvGrpSpPr/>
+        <p:nvPr/>
+      </p:nvGrpSpPr>
+      <p:grpSpPr>
+        <a:xfrm>
+          <a:off x="0" y="0"/>
+          <a:ext cx="0" cy="0"/>
+          <a:chOff x="0" y="0"/>
+          <a:chExt cx="0" cy="0"/>
+        </a:xfrm>
+      </p:grpSpPr>
+      <p:sp useBgFill="1">
+        <p:nvSpPr>
+          <p:cNvPr id="16" name="Rectangle 15">
+            <a:extLst>
+              <a:ext uri="{FF2B5EF4-FFF2-40B4-BE49-F238E27FC236}">
+                <a16:creationId xmlns:a16="http://schemas.microsoft.com/office/drawing/2014/main" id="{190D5A80-9469-3B61-4719-24C3F0F95F0C}"/>
+              </a:ext>
+              <a:ext uri="{C183D7F6-B498-43B3-948B-1728B52AA6E4}">
+                <adec:decorative xmlns:adec="http://schemas.microsoft.com/office/drawing/2017/decorative" val="1"/>
+              </a:ext>
+            </a:extLst>
+          </p:cNvPr>
+          <p:cNvSpPr>
+            <a:spLocks noGrp="1" noRot="1" noChangeAspect="1" noMove="1" noResize="1" noEditPoints="1" noAdjustHandles="1" noChangeArrowheads="1" noChangeShapeType="1" noTextEdit="1"/>
+          </p:cNvSpPr>
+          <p:nvPr>
+            <p:extLst>
+              <p:ext uri="{386F3935-93C4-4BCD-93E2-E3B085C9AB24}">
+                <p16:designElem xmlns:p16="http://schemas.microsoft.com/office/powerpoint/2015/main" val="1"/>
+              </p:ext>
+            </p:extLst>
+          </p:nvPr>
+        </p:nvSpPr>
+        <p:spPr>
+          <a:xfrm>
+            <a:off x="0" y="0"/>
+            <a:ext cx="12192000" cy="6858000"/>
+          </a:xfrm>
+          <a:prstGeom prst="rect">
+            <a:avLst/>
+          </a:prstGeom>
+          <a:ln w="12700" cap="flat" cmpd="sng" algn="ctr">
+            <a:noFill/>
+            <a:prstDash val="solid"/>
+            <a:miter lim="800000"/>
+          </a:ln>
+          <a:effectLst/>
+          <a:extLst>
+            <a:ext uri="{91240B29-F687-4F45-9708-019B960494DF}">
+              <a14:hiddenLine xmlns:a14="http://schemas.microsoft.com/office/drawing/2010/main" w="12700" cap="flat" cmpd="sng" algn="ctr">
+                <a:solidFill>
+                  <a:schemeClr val="accent1">
+                    <a:shade val="50000"/>
+                  </a:schemeClr>
+                </a:solidFill>
+                <a:prstDash val="solid"/>
+                <a:miter lim="800000"/>
+              </a14:hiddenLine>
+            </a:ext>
+          </a:extLst>
+        </p:spPr>
+        <p:style>
+          <a:lnRef idx="2">
+            <a:schemeClr val="accent1">
+              <a:shade val="50000"/>
+            </a:schemeClr>
+          </a:lnRef>
+          <a:fillRef idx="1">
+            <a:schemeClr val="accent1"/>
+          </a:fillRef>
+          <a:effectRef idx="0">
+            <a:schemeClr val="accent1"/>
+          </a:effectRef>
+          <a:fontRef idx="minor">
+            <a:schemeClr val="lt1"/>
+          </a:fontRef>
+        </p:style>
+        <p:txBody>
+          <a:bodyPr rtlCol="0" anchor="ctr"/>
+          <a:lstStyle/>
+          <a:p>
+            <a:pPr algn="ctr"/>
+            <a:endParaRPr lang="en-US"/>
+          </a:p>
+        </p:txBody>
+      </p:sp>
+      <p:sp>
+        <p:nvSpPr>
+          <p:cNvPr id="18" name="Rectangle 17">
+            <a:extLst>
+              <a:ext uri="{FF2B5EF4-FFF2-40B4-BE49-F238E27FC236}">
+                <a16:creationId xmlns:a16="http://schemas.microsoft.com/office/drawing/2014/main" id="{0EEF37A6-0233-E467-9355-0836E8DAC04B}"/>
+              </a:ext>
+              <a:ext uri="{C183D7F6-B498-43B3-948B-1728B52AA6E4}">
+                <adec:decorative xmlns:adec="http://schemas.microsoft.com/office/drawing/2017/decorative" val="1"/>
+              </a:ext>
+            </a:extLst>
+          </p:cNvPr>
+          <p:cNvSpPr>
+            <a:spLocks noGrp="1" noRot="1" noChangeAspect="1" noMove="1" noResize="1" noEditPoints="1" noAdjustHandles="1" noChangeArrowheads="1" noChangeShapeType="1" noTextEdit="1"/>
+          </p:cNvSpPr>
+          <p:nvPr>
+            <p:extLst>
+              <p:ext uri="{386F3935-93C4-4BCD-93E2-E3B085C9AB24}">
+                <p16:designElem xmlns:p16="http://schemas.microsoft.com/office/powerpoint/2015/main" val="1"/>
+              </p:ext>
+            </p:extLst>
+          </p:nvPr>
+        </p:nvSpPr>
+        <p:spPr>
+          <a:xfrm flipH="1">
+            <a:off x="2" y="0"/>
+            <a:ext cx="12191998" cy="1575955"/>
+          </a:xfrm>
+          <a:prstGeom prst="rect">
+            <a:avLst/>
+          </a:prstGeom>
+          <a:gradFill>
+            <a:gsLst>
+              <a:gs pos="0">
+                <a:srgbClr val="000000">
+                  <a:alpha val="96000"/>
+                </a:srgbClr>
+              </a:gs>
+              <a:gs pos="100000">
+                <a:schemeClr val="accent1">
+                  <a:lumMod val="75000"/>
+                </a:schemeClr>
+              </a:gs>
+            </a:gsLst>
+            <a:lin ang="8400000" scaled="0"/>
+          </a:gradFill>
+          <a:ln>
+            <a:noFill/>
+          </a:ln>
+        </p:spPr>
+        <p:style>
+          <a:lnRef idx="2">
+            <a:schemeClr val="accent1">
+              <a:shade val="50000"/>
+            </a:schemeClr>
+          </a:lnRef>
+          <a:fillRef idx="1">
+            <a:schemeClr val="accent1"/>
+          </a:fillRef>
+          <a:effectRef idx="0">
+            <a:schemeClr val="accent1"/>
+          </a:effectRef>
+          <a:fontRef idx="minor">
+            <a:schemeClr val="lt1"/>
+          </a:fontRef>
+        </p:style>
+        <p:txBody>
+          <a:bodyPr rtlCol="0" anchor="ctr"/>
+          <a:lstStyle/>
+          <a:p>
+            <a:pPr algn="ctr"/>
+            <a:endParaRPr lang="en-US"/>
+          </a:p>
+        </p:txBody>
+      </p:sp>
+      <p:sp>
+        <p:nvSpPr>
+          <p:cNvPr id="13" name="Rectangle 12">
+            <a:extLst>
+              <a:ext uri="{FF2B5EF4-FFF2-40B4-BE49-F238E27FC236}">
+                <a16:creationId xmlns:a16="http://schemas.microsoft.com/office/drawing/2014/main" id="{43A04EB5-AE67-FE7E-DD08-AA3C796774E1}"/>
+              </a:ext>
+              <a:ext uri="{C183D7F6-B498-43B3-948B-1728B52AA6E4}">
+                <adec:decorative xmlns:adec="http://schemas.microsoft.com/office/drawing/2017/decorative" val="1"/>
+              </a:ext>
+            </a:extLst>
+          </p:cNvPr>
+          <p:cNvSpPr>
+            <a:spLocks noGrp="1" noRot="1" noChangeAspect="1" noMove="1" noResize="1" noEditPoints="1" noAdjustHandles="1" noChangeArrowheads="1" noChangeShapeType="1" noTextEdit="1"/>
+          </p:cNvSpPr>
+          <p:nvPr>
+            <p:extLst>
+              <p:ext uri="{386F3935-93C4-4BCD-93E2-E3B085C9AB24}">
+                <p16:designElem xmlns:p16="http://schemas.microsoft.com/office/powerpoint/2015/main" val="1"/>
+              </p:ext>
+            </p:extLst>
+          </p:nvPr>
+        </p:nvSpPr>
+        <p:spPr>
+          <a:xfrm rot="10800000" flipH="1">
+            <a:off x="8128857" y="0"/>
+            <a:ext cx="4063143" cy="1576412"/>
+          </a:xfrm>
+          <a:prstGeom prst="rect">
+            <a:avLst/>
+          </a:prstGeom>
+          <a:gradFill>
+            <a:gsLst>
+              <a:gs pos="19000">
+                <a:schemeClr val="accent1">
+                  <a:lumMod val="50000"/>
+                  <a:alpha val="68000"/>
+                </a:schemeClr>
+              </a:gs>
+              <a:gs pos="100000">
+                <a:schemeClr val="accent1">
+                  <a:alpha val="79000"/>
+                </a:schemeClr>
+              </a:gs>
+            </a:gsLst>
+            <a:lin ang="19200000" scaled="0"/>
+          </a:gradFill>
+          <a:ln>
+            <a:noFill/>
+          </a:ln>
+        </p:spPr>
+        <p:style>
+          <a:lnRef idx="2">
+            <a:schemeClr val="accent1">
+              <a:shade val="50000"/>
+            </a:schemeClr>
+          </a:lnRef>
+          <a:fillRef idx="1">
+            <a:schemeClr val="accent1"/>
+          </a:fillRef>
+          <a:effectRef idx="0">
+            <a:schemeClr val="accent1"/>
+          </a:effectRef>
+          <a:fontRef idx="minor">
+            <a:schemeClr val="lt1"/>
+          </a:fontRef>
+        </p:style>
+        <p:txBody>
+          <a:bodyPr rtlCol="0" anchor="ctr"/>
+          <a:lstStyle/>
+          <a:p>
+            <a:pPr algn="ctr"/>
+            <a:endParaRPr lang="en-US"/>
+          </a:p>
+        </p:txBody>
+      </p:sp>
+      <p:sp>
+        <p:nvSpPr>
+          <p:cNvPr id="14" name="Rectangle 13">
+            <a:extLst>
+              <a:ext uri="{FF2B5EF4-FFF2-40B4-BE49-F238E27FC236}">
+                <a16:creationId xmlns:a16="http://schemas.microsoft.com/office/drawing/2014/main" id="{BAD14623-97C3-9C05-488A-CD052C49AC66}"/>
+              </a:ext>
+              <a:ext uri="{C183D7F6-B498-43B3-948B-1728B52AA6E4}">
+                <adec:decorative xmlns:adec="http://schemas.microsoft.com/office/drawing/2017/decorative" val="1"/>
+              </a:ext>
+            </a:extLst>
+          </p:cNvPr>
+          <p:cNvSpPr>
+            <a:spLocks noGrp="1" noRot="1" noChangeAspect="1" noMove="1" noResize="1" noEditPoints="1" noAdjustHandles="1" noChangeArrowheads="1" noChangeShapeType="1" noTextEdit="1"/>
+          </p:cNvSpPr>
+          <p:nvPr>
+            <p:extLst>
+              <p:ext uri="{386F3935-93C4-4BCD-93E2-E3B085C9AB24}">
+                <p16:designElem xmlns:p16="http://schemas.microsoft.com/office/powerpoint/2015/main" val="1"/>
+              </p:ext>
+            </p:extLst>
+          </p:nvPr>
+        </p:nvSpPr>
+        <p:spPr>
+          <a:xfrm rot="5400000">
+            <a:off x="5307777" y="-5307778"/>
+            <a:ext cx="1576446" cy="12192002"/>
+          </a:xfrm>
+          <a:prstGeom prst="rect">
+            <a:avLst/>
+          </a:prstGeom>
+          <a:gradFill>
+            <a:gsLst>
+              <a:gs pos="23000">
+                <a:schemeClr val="accent1">
+                  <a:alpha val="0"/>
+                </a:schemeClr>
+              </a:gs>
+              <a:gs pos="99000">
+                <a:srgbClr val="000000">
+                  <a:alpha val="74000"/>
+                </a:srgbClr>
+              </a:gs>
+            </a:gsLst>
+            <a:lin ang="20400000" scaled="0"/>
+          </a:gradFill>
+          <a:ln>
+            <a:noFill/>
+          </a:ln>
+        </p:spPr>
+        <p:style>
+          <a:lnRef idx="2">
+            <a:schemeClr val="accent1">
+              <a:shade val="50000"/>
+            </a:schemeClr>
+          </a:lnRef>
+          <a:fillRef idx="1">
+            <a:schemeClr val="accent1"/>
+          </a:fillRef>
+          <a:effectRef idx="0">
+            <a:schemeClr val="accent1"/>
+          </a:effectRef>
+          <a:fontRef idx="minor">
+            <a:schemeClr val="lt1"/>
+          </a:fontRef>
+        </p:style>
+        <p:txBody>
+          <a:bodyPr rtlCol="0" anchor="ctr"/>
+          <a:lstStyle/>
+          <a:p>
+            <a:pPr algn="ctr"/>
+            <a:endParaRPr lang="en-US"/>
+          </a:p>
+        </p:txBody>
+      </p:sp>
+      <p:sp>
+        <p:nvSpPr>
+          <p:cNvPr id="6" name="TextBox 5">
+            <a:extLst>
+              <a:ext uri="{FF2B5EF4-FFF2-40B4-BE49-F238E27FC236}">
+                <a16:creationId xmlns:a16="http://schemas.microsoft.com/office/drawing/2014/main" id="{9E851BA4-D62B-7D10-7BBF-3CF4F83F7176}"/>
+              </a:ext>
+            </a:extLst>
+          </p:cNvPr>
+          <p:cNvSpPr txBox="1"/>
+          <p:nvPr/>
+        </p:nvSpPr>
+        <p:spPr>
+          <a:xfrm>
+            <a:off x="1147661" y="357907"/>
+            <a:ext cx="10044023" cy="877729"/>
+          </a:xfrm>
+          <a:prstGeom prst="rect">
+            <a:avLst/>
+          </a:prstGeom>
+        </p:spPr>
+        <p:txBody>
+          <a:bodyPr vert="horz" lIns="91440" tIns="45720" rIns="91440" bIns="45720" rtlCol="0" anchor="ctr">
+            <a:normAutofit/>
+          </a:bodyPr>
+          <a:lstStyle/>
+          <a:p>
+            <a:pPr defTabSz="914400">
+              <a:lnSpc>
+                <a:spcPct val="90000"/>
+              </a:lnSpc>
+              <a:spcBef>
+                <a:spcPct val="0"/>
+              </a:spcBef>
+              <a:spcAft>
+                <a:spcPts val="600"/>
+              </a:spcAft>
+            </a:pPr>
+            <a:r>
+              <a:rPr lang="pl-PL" sz="4400" b="1" dirty="0" err="1">
+                <a:solidFill>
+                  <a:srgbClr val="FFFFFF"/>
+                </a:solidFill>
+                <a:latin typeface="+mj-lt"/>
+                <a:ea typeface="+mj-ea"/>
+                <a:cs typeface="+mj-cs"/>
+              </a:rPr>
+              <a:t>Jupyter</a:t>
+            </a:r>
+            <a:r>
+              <a:rPr lang="pl-PL" sz="4400" b="1" dirty="0">
+                <a:solidFill>
+                  <a:srgbClr val="FFFFFF"/>
+                </a:solidFill>
+                <a:latin typeface="+mj-lt"/>
+                <a:ea typeface="+mj-ea"/>
+                <a:cs typeface="+mj-cs"/>
+              </a:rPr>
+              <a:t> Notebook vs Google </a:t>
+            </a:r>
+            <a:r>
+              <a:rPr lang="pl-PL" sz="4400" b="1" dirty="0" err="1">
+                <a:solidFill>
+                  <a:srgbClr val="FFFFFF"/>
+                </a:solidFill>
+                <a:latin typeface="+mj-lt"/>
+                <a:ea typeface="+mj-ea"/>
+                <a:cs typeface="+mj-cs"/>
+              </a:rPr>
+              <a:t>Colab</a:t>
+            </a:r>
+            <a:endParaRPr lang="en-US" sz="4400" b="1" kern="1200" dirty="0">
+              <a:solidFill>
+                <a:srgbClr val="FFFFFF"/>
+              </a:solidFill>
+              <a:latin typeface="+mj-lt"/>
+              <a:ea typeface="+mj-ea"/>
+              <a:cs typeface="+mj-cs"/>
+            </a:endParaRPr>
+          </a:p>
+        </p:txBody>
+      </p:sp>
+      <p:sp>
+        <p:nvSpPr>
+          <p:cNvPr id="8" name="pole tekstowe 7">
+            <a:extLst>
+              <a:ext uri="{FF2B5EF4-FFF2-40B4-BE49-F238E27FC236}">
+                <a16:creationId xmlns:a16="http://schemas.microsoft.com/office/drawing/2014/main" id="{8386B39D-CEF2-CAD8-B130-C9129E26C999}"/>
+              </a:ext>
+            </a:extLst>
+          </p:cNvPr>
+          <p:cNvSpPr txBox="1"/>
+          <p:nvPr/>
+        </p:nvSpPr>
+        <p:spPr>
+          <a:xfrm>
+            <a:off x="1147661" y="3265897"/>
+            <a:ext cx="4264851" cy="1938992"/>
+          </a:xfrm>
+          <a:prstGeom prst="rect">
+            <a:avLst/>
+          </a:prstGeom>
+          <a:noFill/>
+        </p:spPr>
+        <p:txBody>
+          <a:bodyPr wrap="square" rtlCol="0">
+            <a:spAutoFit/>
+          </a:bodyPr>
+          <a:lstStyle/>
+          <a:p>
+            <a:pPr marL="342900" indent="-342900">
+              <a:buFont typeface="Arial" panose="020B0604020202020204" pitchFamily="34" charset="0"/>
+              <a:buChar char="•"/>
+            </a:pPr>
+            <a:r>
+              <a:rPr lang="pl-PL" sz="2400" dirty="0"/>
+              <a:t>Open-</a:t>
+            </a:r>
+            <a:r>
+              <a:rPr lang="pl-PL" sz="2400" dirty="0" err="1"/>
+              <a:t>source</a:t>
+            </a:r>
+            <a:endParaRPr lang="pl-PL" sz="2400" dirty="0"/>
+          </a:p>
+          <a:p>
+            <a:pPr marL="342900" indent="-342900">
+              <a:buFont typeface="Arial" panose="020B0604020202020204" pitchFamily="34" charset="0"/>
+              <a:buChar char="•"/>
+            </a:pPr>
+            <a:r>
+              <a:rPr lang="pl-PL" sz="2400" dirty="0" err="1"/>
+              <a:t>Depends</a:t>
+            </a:r>
+            <a:r>
+              <a:rPr lang="pl-PL" sz="2400" dirty="0"/>
+              <a:t> on </a:t>
+            </a:r>
+            <a:r>
+              <a:rPr lang="pl-PL" sz="2400" dirty="0" err="1"/>
+              <a:t>user’s</a:t>
+            </a:r>
+            <a:r>
+              <a:rPr lang="pl-PL" sz="2400" dirty="0"/>
+              <a:t> </a:t>
+            </a:r>
+            <a:r>
+              <a:rPr lang="pl-PL" sz="2400" dirty="0" err="1"/>
+              <a:t>resources</a:t>
+            </a:r>
+            <a:endParaRPr lang="pl-PL" sz="2400" dirty="0"/>
+          </a:p>
+          <a:p>
+            <a:pPr marL="342900" indent="-342900">
+              <a:buFont typeface="Arial" panose="020B0604020202020204" pitchFamily="34" charset="0"/>
+              <a:buChar char="•"/>
+            </a:pPr>
+            <a:r>
+              <a:rPr lang="pl-PL" sz="2400" dirty="0"/>
+              <a:t>Offline</a:t>
+            </a:r>
+          </a:p>
+          <a:p>
+            <a:pPr marL="342900" indent="-342900">
+              <a:buFont typeface="Arial" panose="020B0604020202020204" pitchFamily="34" charset="0"/>
+              <a:buChar char="•"/>
+            </a:pPr>
+            <a:r>
+              <a:rPr lang="pl-PL" sz="2400" dirty="0" err="1"/>
+              <a:t>Intuitive</a:t>
+            </a:r>
+            <a:r>
+              <a:rPr lang="pl-PL" sz="2400" dirty="0"/>
+              <a:t> UI</a:t>
+            </a:r>
+          </a:p>
+          <a:p>
+            <a:pPr marL="342900" indent="-342900">
+              <a:buFont typeface="Arial" panose="020B0604020202020204" pitchFamily="34" charset="0"/>
+              <a:buChar char="•"/>
+            </a:pPr>
+            <a:r>
+              <a:rPr lang="pl-PL" sz="2400" dirty="0" err="1"/>
+              <a:t>Needed</a:t>
+            </a:r>
+            <a:r>
+              <a:rPr lang="pl-PL" sz="2400" dirty="0"/>
+              <a:t> </a:t>
+            </a:r>
+            <a:r>
+              <a:rPr lang="pl-PL" sz="2400" dirty="0" err="1"/>
+              <a:t>configuration</a:t>
+            </a:r>
+            <a:endParaRPr lang="pl-PL" sz="2400" dirty="0"/>
+          </a:p>
+        </p:txBody>
+      </p:sp>
+      <p:sp>
+        <p:nvSpPr>
+          <p:cNvPr id="11" name="pole tekstowe 10">
+            <a:extLst>
+              <a:ext uri="{FF2B5EF4-FFF2-40B4-BE49-F238E27FC236}">
+                <a16:creationId xmlns:a16="http://schemas.microsoft.com/office/drawing/2014/main" id="{C68086AB-91E5-58F9-E778-4626EEFE5680}"/>
+              </a:ext>
+            </a:extLst>
+          </p:cNvPr>
+          <p:cNvSpPr txBox="1"/>
+          <p:nvPr/>
+        </p:nvSpPr>
+        <p:spPr>
+          <a:xfrm>
+            <a:off x="6438119" y="3265897"/>
+            <a:ext cx="5019869" cy="2308324"/>
+          </a:xfrm>
+          <a:prstGeom prst="rect">
+            <a:avLst/>
+          </a:prstGeom>
+          <a:noFill/>
+        </p:spPr>
+        <p:txBody>
+          <a:bodyPr wrap="square" rtlCol="0">
+            <a:spAutoFit/>
+          </a:bodyPr>
+          <a:lstStyle/>
+          <a:p>
+            <a:pPr marL="342900" indent="-342900">
+              <a:buFont typeface="Arial" panose="020B0604020202020204" pitchFamily="34" charset="0"/>
+              <a:buChar char="•"/>
+            </a:pPr>
+            <a:r>
+              <a:rPr lang="pl-PL" sz="2400" dirty="0"/>
+              <a:t>Limited </a:t>
+            </a:r>
+            <a:r>
+              <a:rPr lang="pl-PL" sz="2400" dirty="0" err="1"/>
+              <a:t>free</a:t>
+            </a:r>
+            <a:r>
+              <a:rPr lang="pl-PL" sz="2400" dirty="0"/>
+              <a:t> version</a:t>
+            </a:r>
+          </a:p>
+          <a:p>
+            <a:pPr marL="342900" indent="-342900">
+              <a:buFont typeface="Arial" panose="020B0604020202020204" pitchFamily="34" charset="0"/>
+              <a:buChar char="•"/>
+            </a:pPr>
+            <a:r>
+              <a:rPr lang="pl-PL" sz="2400" dirty="0" err="1"/>
+              <a:t>Cloud</a:t>
+            </a:r>
+            <a:r>
+              <a:rPr lang="pl-PL" sz="2400" dirty="0"/>
+              <a:t> </a:t>
+            </a:r>
+            <a:r>
+              <a:rPr lang="pl-PL" sz="2400" dirty="0" err="1"/>
+              <a:t>computing</a:t>
+            </a:r>
+            <a:endParaRPr lang="pl-PL" sz="2400" dirty="0"/>
+          </a:p>
+          <a:p>
+            <a:pPr marL="342900" indent="-342900">
+              <a:buFont typeface="Arial" panose="020B0604020202020204" pitchFamily="34" charset="0"/>
+              <a:buChar char="•"/>
+            </a:pPr>
+            <a:r>
+              <a:rPr lang="pl-PL" sz="2400" dirty="0" err="1"/>
+              <a:t>Intuitive</a:t>
+            </a:r>
+            <a:r>
+              <a:rPr lang="pl-PL" sz="2400" dirty="0"/>
+              <a:t> UI</a:t>
+            </a:r>
+          </a:p>
+          <a:p>
+            <a:pPr marL="342900" indent="-342900">
+              <a:buFont typeface="Arial" panose="020B0604020202020204" pitchFamily="34" charset="0"/>
+              <a:buChar char="•"/>
+            </a:pPr>
+            <a:r>
+              <a:rPr lang="pl-PL" sz="2400" dirty="0"/>
+              <a:t>Compatible with </a:t>
+            </a:r>
+            <a:r>
+              <a:rPr lang="pl-PL" sz="2400" dirty="0" err="1"/>
+              <a:t>Jupyter</a:t>
+            </a:r>
+            <a:r>
+              <a:rPr lang="pl-PL" sz="2400" dirty="0"/>
+              <a:t> </a:t>
+            </a:r>
+            <a:r>
+              <a:rPr lang="pl-PL" sz="2400" dirty="0" err="1"/>
+              <a:t>Notebooks</a:t>
+            </a:r>
+            <a:r>
+              <a:rPr lang="pl-PL" sz="2400" dirty="0"/>
+              <a:t>’ </a:t>
+            </a:r>
+            <a:r>
+              <a:rPr lang="pl-PL" sz="2400" dirty="0" err="1"/>
+              <a:t>extensions</a:t>
+            </a:r>
+            <a:endParaRPr lang="pl-PL" sz="2400" dirty="0"/>
+          </a:p>
+          <a:p>
+            <a:pPr marL="342900" indent="-342900">
+              <a:buFont typeface="Arial" panose="020B0604020202020204" pitchFamily="34" charset="0"/>
+              <a:buChar char="•"/>
+            </a:pPr>
+            <a:r>
+              <a:rPr lang="pl-PL" sz="2400" dirty="0"/>
+              <a:t>No </a:t>
+            </a:r>
+            <a:r>
+              <a:rPr lang="pl-PL" sz="2400" dirty="0" err="1"/>
+              <a:t>configuration</a:t>
+            </a:r>
+            <a:r>
+              <a:rPr lang="pl-PL" sz="2400" dirty="0"/>
+              <a:t> </a:t>
+            </a:r>
+            <a:r>
+              <a:rPr lang="pl-PL" sz="2400" dirty="0" err="1"/>
+              <a:t>need</a:t>
+            </a:r>
+            <a:endParaRPr lang="pl-PL" sz="2400" dirty="0"/>
+          </a:p>
+        </p:txBody>
+      </p:sp>
+      <p:pic>
+        <p:nvPicPr>
+          <p:cNvPr id="5" name="Grafika 4">
+            <a:extLst>
+              <a:ext uri="{FF2B5EF4-FFF2-40B4-BE49-F238E27FC236}">
+                <a16:creationId xmlns:a16="http://schemas.microsoft.com/office/drawing/2014/main" id="{399E9C5C-0CAA-7881-5E08-795F0416E457}"/>
+              </a:ext>
+            </a:extLst>
+          </p:cNvPr>
+          <p:cNvPicPr>
+            <a:picLocks noChangeAspect="1"/>
+          </p:cNvPicPr>
+          <p:nvPr/>
+        </p:nvPicPr>
+        <p:blipFill>
+          <a:blip r:embed="rId3">
+            <a:extLst>
+              <a:ext uri="{28A0092B-C50C-407E-A947-70E740481C1C}">
+                <a14:useLocalDpi xmlns:a14="http://schemas.microsoft.com/office/drawing/2010/main" val="0"/>
+              </a:ext>
+              <a:ext uri="{96DAC541-7B7A-43D3-8B79-37D633B846F1}">
+                <asvg:svgBlip xmlns:asvg="http://schemas.microsoft.com/office/drawing/2016/SVG/main" r:embed="rId4"/>
+              </a:ext>
+            </a:extLst>
+          </a:blip>
+          <a:stretch>
+            <a:fillRect/>
+          </a:stretch>
+        </p:blipFill>
+        <p:spPr>
+          <a:xfrm>
+            <a:off x="1147661" y="2304311"/>
+            <a:ext cx="2304665" cy="621894"/>
+          </a:xfrm>
+          <a:prstGeom prst="rect">
+            <a:avLst/>
+          </a:prstGeom>
+        </p:spPr>
+      </p:pic>
+      <p:pic>
+        <p:nvPicPr>
+          <p:cNvPr id="9" name="Obraz 8" descr="Obraz zawierający Czcionka, Grafika, typografia, projekt graficzny&#10;&#10;Opis wygenerowany automatycznie">
+            <a:extLst>
+              <a:ext uri="{FF2B5EF4-FFF2-40B4-BE49-F238E27FC236}">
+                <a16:creationId xmlns:a16="http://schemas.microsoft.com/office/drawing/2014/main" id="{6F2E6BF1-5ADB-EB48-5A3E-DBABA3565DF6}"/>
+              </a:ext>
+            </a:extLst>
+          </p:cNvPr>
+          <p:cNvPicPr>
+            <a:picLocks noChangeAspect="1"/>
+          </p:cNvPicPr>
+          <p:nvPr/>
+        </p:nvPicPr>
+        <p:blipFill>
+          <a:blip r:embed="rId5">
+            <a:extLst>
+              <a:ext uri="{28A0092B-C50C-407E-A947-70E740481C1C}">
+                <a14:useLocalDpi xmlns:a14="http://schemas.microsoft.com/office/drawing/2010/main" val="0"/>
+              </a:ext>
+            </a:extLst>
+          </a:blip>
+          <a:stretch>
+            <a:fillRect/>
+          </a:stretch>
+        </p:blipFill>
+        <p:spPr>
+          <a:xfrm>
+            <a:off x="6438119" y="2208481"/>
+            <a:ext cx="3442999" cy="717724"/>
+          </a:xfrm>
+          <a:prstGeom prst="rect">
+            <a:avLst/>
+          </a:prstGeom>
+        </p:spPr>
+      </p:pic>
+    </p:spTree>
+    <p:extLst>
+      <p:ext uri="{BB962C8B-B14F-4D97-AF65-F5344CB8AC3E}">
+        <p14:creationId xmlns:p14="http://schemas.microsoft.com/office/powerpoint/2010/main" val="1928103626"/>
+      </p:ext>
+    </p:extLst>
+  </p:cSld>
+  <p:clrMapOvr>
+    <a:masterClrMapping/>
+  </p:clrMapOvr>
+</p:sld>
+</file>
+
+<file path=ppt/slides/slide12.xml><?xml version="1.0" encoding="utf-8"?>
+<p:sld xmlns:a="http://schemas.openxmlformats.org/drawingml/2006/main" xmlns:r="http://schemas.openxmlformats.org/officeDocument/2006/relationships" xmlns:p="http://schemas.openxmlformats.org/presentationml/2006/main">
+  <p:cSld>
+    <p:spTree>
+      <p:nvGrpSpPr>
+        <p:cNvPr id="1" name=""/>
+        <p:cNvGrpSpPr/>
+        <p:nvPr/>
+      </p:nvGrpSpPr>
+      <p:grpSpPr>
+        <a:xfrm>
+          <a:off x="0" y="0"/>
+          <a:ext cx="0" cy="0"/>
+          <a:chOff x="0" y="0"/>
+          <a:chExt cx="0" cy="0"/>
+        </a:xfrm>
+      </p:grpSpPr>
+      <p:sp>
+        <p:nvSpPr>
+          <p:cNvPr id="2" name="Tytuł 1">
+            <a:extLst>
+              <a:ext uri="{FF2B5EF4-FFF2-40B4-BE49-F238E27FC236}">
                 <a16:creationId xmlns:a16="http://schemas.microsoft.com/office/drawing/2014/main" id="{949DF840-31EC-86F1-C44A-C3C596D17B5B}"/>
               </a:ext>
             </a:extLst>
@@ -8437,7 +9259,7 @@
 </p:sld>
 </file>
 
-<file path=ppt/slides/slide11.xml><?xml version="1.0" encoding="utf-8"?>
+<file path=ppt/slides/slide13.xml><?xml version="1.0" encoding="utf-8"?>
 <p:sld xmlns:a="http://schemas.openxmlformats.org/drawingml/2006/main" xmlns:r="http://schemas.openxmlformats.org/officeDocument/2006/relationships" xmlns:p="http://schemas.openxmlformats.org/presentationml/2006/main">
   <p:cSld>
     <p:bg>
@@ -8625,7 +9447,7 @@
 </p:sld>
 </file>
 
-<file path=ppt/slides/slide12.xml><?xml version="1.0" encoding="utf-8"?>
+<file path=ppt/slides/slide14.xml><?xml version="1.0" encoding="utf-8"?>
 <p:sld xmlns:a="http://schemas.openxmlformats.org/drawingml/2006/main" xmlns:r="http://schemas.openxmlformats.org/officeDocument/2006/relationships" xmlns:p="http://schemas.openxmlformats.org/presentationml/2006/main">
   <p:cSld>
     <p:bg>
@@ -9842,7 +10664,75 @@
 </p:sld>
 </file>
 
-<file path=ppt/slides/slide13.xml><?xml version="1.0" encoding="utf-8"?>
+<file path=ppt/slides/slide15.xml><?xml version="1.0" encoding="utf-8"?>
+<p:sld xmlns:a="http://schemas.openxmlformats.org/drawingml/2006/main" xmlns:r="http://schemas.openxmlformats.org/officeDocument/2006/relationships" xmlns:p="http://schemas.openxmlformats.org/presentationml/2006/main">
+  <p:cSld>
+    <p:spTree>
+      <p:nvGrpSpPr>
+        <p:cNvPr id="1" name=""/>
+        <p:cNvGrpSpPr/>
+        <p:nvPr/>
+      </p:nvGrpSpPr>
+      <p:grpSpPr>
+        <a:xfrm>
+          <a:off x="0" y="0"/>
+          <a:ext cx="0" cy="0"/>
+          <a:chOff x="0" y="0"/>
+          <a:chExt cx="0" cy="0"/>
+        </a:xfrm>
+      </p:grpSpPr>
+      <p:sp>
+        <p:nvSpPr>
+          <p:cNvPr id="2" name="Tytuł 1">
+            <a:extLst>
+              <a:ext uri="{FF2B5EF4-FFF2-40B4-BE49-F238E27FC236}">
+                <a16:creationId xmlns:a16="http://schemas.microsoft.com/office/drawing/2014/main" id="{684BE6FC-9C82-7E31-C75C-054D03BCEBE2}"/>
+              </a:ext>
+            </a:extLst>
+          </p:cNvPr>
+          <p:cNvSpPr>
+            <a:spLocks noGrp="1"/>
+          </p:cNvSpPr>
+          <p:nvPr>
+            <p:ph type="title"/>
+          </p:nvPr>
+        </p:nvSpPr>
+        <p:spPr>
+          <a:xfrm>
+            <a:off x="3003415" y="2766218"/>
+            <a:ext cx="6185170" cy="1325563"/>
+          </a:xfrm>
+        </p:spPr>
+        <p:txBody>
+          <a:bodyPr/>
+          <a:lstStyle/>
+          <a:p>
+            <a:r>
+              <a:rPr lang="pl-PL" dirty="0"/>
+              <a:t>Machine Learning </a:t>
+            </a:r>
+            <a:r>
+              <a:rPr lang="pl-PL" dirty="0" err="1"/>
+              <a:t>libraries</a:t>
+            </a:r>
+            <a:endParaRPr lang="pl-PL" dirty="0"/>
+          </a:p>
+        </p:txBody>
+      </p:sp>
+    </p:spTree>
+    <p:extLst>
+      <p:ext uri="{BB962C8B-B14F-4D97-AF65-F5344CB8AC3E}">
+        <p14:creationId xmlns:p14="http://schemas.microsoft.com/office/powerpoint/2010/main" val="3822323046"/>
+      </p:ext>
+    </p:extLst>
+  </p:cSld>
+  <p:clrMapOvr>
+    <a:masterClrMapping/>
+  </p:clrMapOvr>
+</p:sld>
+</file>
+
+<file path=ppt/slides/slide16.xml><?xml version="1.0" encoding="utf-8"?>
 <p:sld xmlns:a="http://schemas.openxmlformats.org/drawingml/2006/main" xmlns:r="http://schemas.openxmlformats.org/officeDocument/2006/relationships" xmlns:p="http://schemas.openxmlformats.org/presentationml/2006/main">
   <p:cSld>
     <p:bg>
@@ -10545,7 +11435,7 @@
 </p:sld>
 </file>
 
-<file path=ppt/slides/slide14.xml><?xml version="1.0" encoding="utf-8"?>
+<file path=ppt/slides/slide17.xml><?xml version="1.0" encoding="utf-8"?>
 <p:sld xmlns:a="http://schemas.openxmlformats.org/drawingml/2006/main" xmlns:r="http://schemas.openxmlformats.org/officeDocument/2006/relationships" xmlns:p="http://schemas.openxmlformats.org/presentationml/2006/main">
   <p:cSld>
     <p:spTree>
@@ -10586,7 +11476,7 @@
         </p:nvSpPr>
         <p:spPr>
           <a:xfrm>
-            <a:off x="3061700" y="5017851"/>
+            <a:off x="3061701" y="2560522"/>
             <a:ext cx="6068598" cy="1736956"/>
           </a:xfrm>
         </p:spPr>
@@ -10604,42 +11494,6 @@
           </a:p>
         </p:txBody>
       </p:sp>
-      <p:pic>
-        <p:nvPicPr>
-          <p:cNvPr id="6" name="Obraz 5" descr="Obraz zawierający wzór, kwadrat, sztuka, Grafika&#10;&#10;Opis wygenerowany automatycznie">
-            <a:extLst>
-              <a:ext uri="{FF2B5EF4-FFF2-40B4-BE49-F238E27FC236}">
-                <a16:creationId xmlns:a16="http://schemas.microsoft.com/office/drawing/2014/main" id="{EEDEE5DA-F21A-9723-470F-BC2A2ED10F6E}"/>
-              </a:ext>
-            </a:extLst>
-          </p:cNvPr>
-          <p:cNvPicPr>
-            <a:picLocks noChangeAspect="1"/>
-          </p:cNvPicPr>
-          <p:nvPr/>
-        </p:nvPicPr>
-        <p:blipFill>
-          <a:blip r:embed="rId2">
-            <a:extLst>
-              <a:ext uri="{28A0092B-C50C-407E-A947-70E740481C1C}">
-                <a14:useLocalDpi xmlns:a14="http://schemas.microsoft.com/office/drawing/2010/main" val="0"/>
-              </a:ext>
-            </a:extLst>
-          </a:blip>
-          <a:stretch>
-            <a:fillRect/>
-          </a:stretch>
-        </p:blipFill>
-        <p:spPr>
-          <a:xfrm>
-            <a:off x="3689214" y="291830"/>
-            <a:ext cx="4813570" cy="4813570"/>
-          </a:xfrm>
-          <a:prstGeom prst="rect">
-            <a:avLst/>
-          </a:prstGeom>
-        </p:spPr>
-      </p:pic>
     </p:spTree>
     <p:extLst>
       <p:ext uri="{BB962C8B-B14F-4D97-AF65-F5344CB8AC3E}">
@@ -10653,7 +11507,7 @@
 </p:sld>
 </file>
 
-<file path=ppt/slides/slide15.xml><?xml version="1.0" encoding="utf-8"?>
+<file path=ppt/slides/slide18.xml><?xml version="1.0" encoding="utf-8"?>
 <p:sld xmlns:a="http://schemas.openxmlformats.org/drawingml/2006/main" xmlns:r="http://schemas.openxmlformats.org/officeDocument/2006/relationships" xmlns:p="http://schemas.openxmlformats.org/presentationml/2006/main">
   <p:cSld>
     <p:bg>
@@ -11411,7 +12265,7 @@
 </p:sld>
 </file>
 
-<file path=ppt/slides/slide16.xml><?xml version="1.0" encoding="utf-8"?>
+<file path=ppt/slides/slide19.xml><?xml version="1.0" encoding="utf-8"?>
 <p:sld xmlns:a="http://schemas.openxmlformats.org/drawingml/2006/main" xmlns:r="http://schemas.openxmlformats.org/officeDocument/2006/relationships" xmlns:p="http://schemas.openxmlformats.org/presentationml/2006/main">
   <p:cSld>
     <p:bg>
@@ -12097,226 +12951,6 @@
     <p:extLst>
       <p:ext uri="{BB962C8B-B14F-4D97-AF65-F5344CB8AC3E}">
         <p14:creationId xmlns:p14="http://schemas.microsoft.com/office/powerpoint/2010/main" val="525436954"/>
-      </p:ext>
-    </p:extLst>
-  </p:cSld>
-  <p:clrMapOvr>
-    <a:masterClrMapping/>
-  </p:clrMapOvr>
-</p:sld>
-</file>
-
-<file path=ppt/slides/slide17.xml><?xml version="1.0" encoding="utf-8"?>
-<p:sld xmlns:a="http://schemas.openxmlformats.org/drawingml/2006/main" xmlns:r="http://schemas.openxmlformats.org/officeDocument/2006/relationships" xmlns:p="http://schemas.openxmlformats.org/presentationml/2006/main">
-  <p:cSld>
-    <p:spTree>
-      <p:nvGrpSpPr>
-        <p:cNvPr id="1" name="">
-          <a:extLst>
-            <a:ext uri="{FF2B5EF4-FFF2-40B4-BE49-F238E27FC236}">
-              <a16:creationId xmlns:a16="http://schemas.microsoft.com/office/drawing/2014/main" id="{7179819B-7559-DDAC-C40A-2EE48B8ABDFD}"/>
-            </a:ext>
-          </a:extLst>
-        </p:cNvPr>
-        <p:cNvGrpSpPr/>
-        <p:nvPr/>
-      </p:nvGrpSpPr>
-      <p:grpSpPr>
-        <a:xfrm>
-          <a:off x="0" y="0"/>
-          <a:ext cx="0" cy="0"/>
-          <a:chOff x="0" y="0"/>
-          <a:chExt cx="0" cy="0"/>
-        </a:xfrm>
-      </p:grpSpPr>
-      <p:sp>
-        <p:nvSpPr>
-          <p:cNvPr id="2" name="Tytuł 1">
-            <a:extLst>
-              <a:ext uri="{FF2B5EF4-FFF2-40B4-BE49-F238E27FC236}">
-                <a16:creationId xmlns:a16="http://schemas.microsoft.com/office/drawing/2014/main" id="{C63AD472-B3DD-E047-C133-115A430AD0A6}"/>
-              </a:ext>
-            </a:extLst>
-          </p:cNvPr>
-          <p:cNvSpPr>
-            <a:spLocks noGrp="1"/>
-          </p:cNvSpPr>
-          <p:nvPr>
-            <p:ph type="title"/>
-          </p:nvPr>
-        </p:nvSpPr>
-        <p:spPr>
-          <a:xfrm>
-            <a:off x="3061701" y="2560522"/>
-            <a:ext cx="6068598" cy="1736956"/>
-          </a:xfrm>
-        </p:spPr>
-        <p:txBody>
-          <a:bodyPr>
-            <a:normAutofit/>
-          </a:bodyPr>
-          <a:lstStyle/>
-          <a:p>
-            <a:pPr algn="ctr"/>
-            <a:r>
-              <a:rPr lang="pl-PL" sz="5400" dirty="0"/>
-              <a:t>Notebook s1_EDA</a:t>
-            </a:r>
-          </a:p>
-        </p:txBody>
-      </p:sp>
-    </p:spTree>
-    <p:extLst>
-      <p:ext uri="{BB962C8B-B14F-4D97-AF65-F5344CB8AC3E}">
-        <p14:creationId xmlns:p14="http://schemas.microsoft.com/office/powerpoint/2010/main" val="1247069255"/>
-      </p:ext>
-    </p:extLst>
-  </p:cSld>
-  <p:clrMapOvr>
-    <a:masterClrMapping/>
-  </p:clrMapOvr>
-</p:sld>
-</file>
-
-<file path=ppt/slides/slide18.xml><?xml version="1.0" encoding="utf-8"?>
-<p:sld xmlns:a="http://schemas.openxmlformats.org/drawingml/2006/main" xmlns:r="http://schemas.openxmlformats.org/officeDocument/2006/relationships" xmlns:p="http://schemas.openxmlformats.org/presentationml/2006/main">
-  <p:cSld>
-    <p:spTree>
-      <p:nvGrpSpPr>
-        <p:cNvPr id="1" name="">
-          <a:extLst>
-            <a:ext uri="{FF2B5EF4-FFF2-40B4-BE49-F238E27FC236}">
-              <a16:creationId xmlns:a16="http://schemas.microsoft.com/office/drawing/2014/main" id="{325E8E66-B894-F0E4-0220-2A473F538142}"/>
-            </a:ext>
-          </a:extLst>
-        </p:cNvPr>
-        <p:cNvGrpSpPr/>
-        <p:nvPr/>
-      </p:nvGrpSpPr>
-      <p:grpSpPr>
-        <a:xfrm>
-          <a:off x="0" y="0"/>
-          <a:ext cx="0" cy="0"/>
-          <a:chOff x="0" y="0"/>
-          <a:chExt cx="0" cy="0"/>
-        </a:xfrm>
-      </p:grpSpPr>
-      <p:sp>
-        <p:nvSpPr>
-          <p:cNvPr id="2" name="Tytuł 1">
-            <a:extLst>
-              <a:ext uri="{FF2B5EF4-FFF2-40B4-BE49-F238E27FC236}">
-                <a16:creationId xmlns:a16="http://schemas.microsoft.com/office/drawing/2014/main" id="{B91E2C89-BB73-7F78-F49D-4FF5D6C69A75}"/>
-              </a:ext>
-            </a:extLst>
-          </p:cNvPr>
-          <p:cNvSpPr>
-            <a:spLocks noGrp="1"/>
-          </p:cNvSpPr>
-          <p:nvPr>
-            <p:ph type="title"/>
-          </p:nvPr>
-        </p:nvSpPr>
-        <p:spPr>
-          <a:xfrm>
-            <a:off x="3061701" y="2560522"/>
-            <a:ext cx="6068598" cy="1736956"/>
-          </a:xfrm>
-        </p:spPr>
-        <p:txBody>
-          <a:bodyPr>
-            <a:normAutofit/>
-          </a:bodyPr>
-          <a:lstStyle/>
-          <a:p>
-            <a:pPr algn="ctr"/>
-            <a:r>
-              <a:rPr lang="pl-PL" sz="5400" dirty="0"/>
-              <a:t>Notebook s1_EDA_exercise</a:t>
-            </a:r>
-          </a:p>
-        </p:txBody>
-      </p:sp>
-    </p:spTree>
-    <p:extLst>
-      <p:ext uri="{BB962C8B-B14F-4D97-AF65-F5344CB8AC3E}">
-        <p14:creationId xmlns:p14="http://schemas.microsoft.com/office/powerpoint/2010/main" val="2506992782"/>
-      </p:ext>
-    </p:extLst>
-  </p:cSld>
-  <p:clrMapOvr>
-    <a:masterClrMapping/>
-  </p:clrMapOvr>
-</p:sld>
-</file>
-
-<file path=ppt/slides/slide19.xml><?xml version="1.0" encoding="utf-8"?>
-<p:sld xmlns:a="http://schemas.openxmlformats.org/drawingml/2006/main" xmlns:r="http://schemas.openxmlformats.org/officeDocument/2006/relationships" xmlns:p="http://schemas.openxmlformats.org/presentationml/2006/main">
-  <p:cSld>
-    <p:spTree>
-      <p:nvGrpSpPr>
-        <p:cNvPr id="1" name="">
-          <a:extLst>
-            <a:ext uri="{FF2B5EF4-FFF2-40B4-BE49-F238E27FC236}">
-              <a16:creationId xmlns:a16="http://schemas.microsoft.com/office/drawing/2014/main" id="{CA3BD80D-E070-CB3C-8F22-D736427308E5}"/>
-            </a:ext>
-          </a:extLst>
-        </p:cNvPr>
-        <p:cNvGrpSpPr/>
-        <p:nvPr/>
-      </p:nvGrpSpPr>
-      <p:grpSpPr>
-        <a:xfrm>
-          <a:off x="0" y="0"/>
-          <a:ext cx="0" cy="0"/>
-          <a:chOff x="0" y="0"/>
-          <a:chExt cx="0" cy="0"/>
-        </a:xfrm>
-      </p:grpSpPr>
-      <p:sp>
-        <p:nvSpPr>
-          <p:cNvPr id="2" name="Tytuł 1">
-            <a:extLst>
-              <a:ext uri="{FF2B5EF4-FFF2-40B4-BE49-F238E27FC236}">
-                <a16:creationId xmlns:a16="http://schemas.microsoft.com/office/drawing/2014/main" id="{17FEC733-EBBA-1A56-46BD-FB9F25A5FCED}"/>
-              </a:ext>
-            </a:extLst>
-          </p:cNvPr>
-          <p:cNvSpPr>
-            <a:spLocks noGrp="1"/>
-          </p:cNvSpPr>
-          <p:nvPr>
-            <p:ph type="title"/>
-          </p:nvPr>
-        </p:nvSpPr>
-        <p:spPr>
-          <a:xfrm>
-            <a:off x="4410075" y="2560522"/>
-            <a:ext cx="3371850" cy="1736956"/>
-          </a:xfrm>
-        </p:spPr>
-        <p:txBody>
-          <a:bodyPr>
-            <a:normAutofit/>
-          </a:bodyPr>
-          <a:lstStyle/>
-          <a:p>
-            <a:pPr algn="ctr"/>
-            <a:r>
-              <a:rPr lang="pl-PL" sz="5400" dirty="0" err="1"/>
-              <a:t>Questions</a:t>
-            </a:r>
-            <a:r>
-              <a:rPr lang="pl-PL" sz="5400" dirty="0"/>
-              <a:t>?</a:t>
-            </a:r>
-          </a:p>
-        </p:txBody>
-      </p:sp>
-    </p:spTree>
-    <p:extLst>
-      <p:ext uri="{BB962C8B-B14F-4D97-AF65-F5344CB8AC3E}">
-        <p14:creationId xmlns:p14="http://schemas.microsoft.com/office/powerpoint/2010/main" val="1886228885"/>
       </p:ext>
     </p:extLst>
   </p:cSld>
@@ -13076,6 +13710,226 @@
 <file path=ppt/slides/slide20.xml><?xml version="1.0" encoding="utf-8"?>
 <p:sld xmlns:a="http://schemas.openxmlformats.org/drawingml/2006/main" xmlns:r="http://schemas.openxmlformats.org/officeDocument/2006/relationships" xmlns:p="http://schemas.openxmlformats.org/presentationml/2006/main">
   <p:cSld>
+    <p:spTree>
+      <p:nvGrpSpPr>
+        <p:cNvPr id="1" name="">
+          <a:extLst>
+            <a:ext uri="{FF2B5EF4-FFF2-40B4-BE49-F238E27FC236}">
+              <a16:creationId xmlns:a16="http://schemas.microsoft.com/office/drawing/2014/main" id="{7179819B-7559-DDAC-C40A-2EE48B8ABDFD}"/>
+            </a:ext>
+          </a:extLst>
+        </p:cNvPr>
+        <p:cNvGrpSpPr/>
+        <p:nvPr/>
+      </p:nvGrpSpPr>
+      <p:grpSpPr>
+        <a:xfrm>
+          <a:off x="0" y="0"/>
+          <a:ext cx="0" cy="0"/>
+          <a:chOff x="0" y="0"/>
+          <a:chExt cx="0" cy="0"/>
+        </a:xfrm>
+      </p:grpSpPr>
+      <p:sp>
+        <p:nvSpPr>
+          <p:cNvPr id="2" name="Tytuł 1">
+            <a:extLst>
+              <a:ext uri="{FF2B5EF4-FFF2-40B4-BE49-F238E27FC236}">
+                <a16:creationId xmlns:a16="http://schemas.microsoft.com/office/drawing/2014/main" id="{C63AD472-B3DD-E047-C133-115A430AD0A6}"/>
+              </a:ext>
+            </a:extLst>
+          </p:cNvPr>
+          <p:cNvSpPr>
+            <a:spLocks noGrp="1"/>
+          </p:cNvSpPr>
+          <p:nvPr>
+            <p:ph type="title"/>
+          </p:nvPr>
+        </p:nvSpPr>
+        <p:spPr>
+          <a:xfrm>
+            <a:off x="3061701" y="2560522"/>
+            <a:ext cx="6068598" cy="1736956"/>
+          </a:xfrm>
+        </p:spPr>
+        <p:txBody>
+          <a:bodyPr>
+            <a:normAutofit/>
+          </a:bodyPr>
+          <a:lstStyle/>
+          <a:p>
+            <a:pPr algn="ctr"/>
+            <a:r>
+              <a:rPr lang="pl-PL" sz="5400" dirty="0"/>
+              <a:t>Notebook s1_EDA</a:t>
+            </a:r>
+          </a:p>
+        </p:txBody>
+      </p:sp>
+    </p:spTree>
+    <p:extLst>
+      <p:ext uri="{BB962C8B-B14F-4D97-AF65-F5344CB8AC3E}">
+        <p14:creationId xmlns:p14="http://schemas.microsoft.com/office/powerpoint/2010/main" val="1247069255"/>
+      </p:ext>
+    </p:extLst>
+  </p:cSld>
+  <p:clrMapOvr>
+    <a:masterClrMapping/>
+  </p:clrMapOvr>
+</p:sld>
+</file>
+
+<file path=ppt/slides/slide21.xml><?xml version="1.0" encoding="utf-8"?>
+<p:sld xmlns:a="http://schemas.openxmlformats.org/drawingml/2006/main" xmlns:r="http://schemas.openxmlformats.org/officeDocument/2006/relationships" xmlns:p="http://schemas.openxmlformats.org/presentationml/2006/main">
+  <p:cSld>
+    <p:spTree>
+      <p:nvGrpSpPr>
+        <p:cNvPr id="1" name="">
+          <a:extLst>
+            <a:ext uri="{FF2B5EF4-FFF2-40B4-BE49-F238E27FC236}">
+              <a16:creationId xmlns:a16="http://schemas.microsoft.com/office/drawing/2014/main" id="{325E8E66-B894-F0E4-0220-2A473F538142}"/>
+            </a:ext>
+          </a:extLst>
+        </p:cNvPr>
+        <p:cNvGrpSpPr/>
+        <p:nvPr/>
+      </p:nvGrpSpPr>
+      <p:grpSpPr>
+        <a:xfrm>
+          <a:off x="0" y="0"/>
+          <a:ext cx="0" cy="0"/>
+          <a:chOff x="0" y="0"/>
+          <a:chExt cx="0" cy="0"/>
+        </a:xfrm>
+      </p:grpSpPr>
+      <p:sp>
+        <p:nvSpPr>
+          <p:cNvPr id="2" name="Tytuł 1">
+            <a:extLst>
+              <a:ext uri="{FF2B5EF4-FFF2-40B4-BE49-F238E27FC236}">
+                <a16:creationId xmlns:a16="http://schemas.microsoft.com/office/drawing/2014/main" id="{B91E2C89-BB73-7F78-F49D-4FF5D6C69A75}"/>
+              </a:ext>
+            </a:extLst>
+          </p:cNvPr>
+          <p:cNvSpPr>
+            <a:spLocks noGrp="1"/>
+          </p:cNvSpPr>
+          <p:nvPr>
+            <p:ph type="title"/>
+          </p:nvPr>
+        </p:nvSpPr>
+        <p:spPr>
+          <a:xfrm>
+            <a:off x="3061701" y="2560522"/>
+            <a:ext cx="6068598" cy="1736956"/>
+          </a:xfrm>
+        </p:spPr>
+        <p:txBody>
+          <a:bodyPr>
+            <a:normAutofit/>
+          </a:bodyPr>
+          <a:lstStyle/>
+          <a:p>
+            <a:pPr algn="ctr"/>
+            <a:r>
+              <a:rPr lang="pl-PL" sz="5400" dirty="0"/>
+              <a:t>Notebook s1_EDA_exercise</a:t>
+            </a:r>
+          </a:p>
+        </p:txBody>
+      </p:sp>
+    </p:spTree>
+    <p:extLst>
+      <p:ext uri="{BB962C8B-B14F-4D97-AF65-F5344CB8AC3E}">
+        <p14:creationId xmlns:p14="http://schemas.microsoft.com/office/powerpoint/2010/main" val="2506992782"/>
+      </p:ext>
+    </p:extLst>
+  </p:cSld>
+  <p:clrMapOvr>
+    <a:masterClrMapping/>
+  </p:clrMapOvr>
+</p:sld>
+</file>
+
+<file path=ppt/slides/slide22.xml><?xml version="1.0" encoding="utf-8"?>
+<p:sld xmlns:a="http://schemas.openxmlformats.org/drawingml/2006/main" xmlns:r="http://schemas.openxmlformats.org/officeDocument/2006/relationships" xmlns:p="http://schemas.openxmlformats.org/presentationml/2006/main">
+  <p:cSld>
+    <p:spTree>
+      <p:nvGrpSpPr>
+        <p:cNvPr id="1" name="">
+          <a:extLst>
+            <a:ext uri="{FF2B5EF4-FFF2-40B4-BE49-F238E27FC236}">
+              <a16:creationId xmlns:a16="http://schemas.microsoft.com/office/drawing/2014/main" id="{CA3BD80D-E070-CB3C-8F22-D736427308E5}"/>
+            </a:ext>
+          </a:extLst>
+        </p:cNvPr>
+        <p:cNvGrpSpPr/>
+        <p:nvPr/>
+      </p:nvGrpSpPr>
+      <p:grpSpPr>
+        <a:xfrm>
+          <a:off x="0" y="0"/>
+          <a:ext cx="0" cy="0"/>
+          <a:chOff x="0" y="0"/>
+          <a:chExt cx="0" cy="0"/>
+        </a:xfrm>
+      </p:grpSpPr>
+      <p:sp>
+        <p:nvSpPr>
+          <p:cNvPr id="2" name="Tytuł 1">
+            <a:extLst>
+              <a:ext uri="{FF2B5EF4-FFF2-40B4-BE49-F238E27FC236}">
+                <a16:creationId xmlns:a16="http://schemas.microsoft.com/office/drawing/2014/main" id="{17FEC733-EBBA-1A56-46BD-FB9F25A5FCED}"/>
+              </a:ext>
+            </a:extLst>
+          </p:cNvPr>
+          <p:cNvSpPr>
+            <a:spLocks noGrp="1"/>
+          </p:cNvSpPr>
+          <p:nvPr>
+            <p:ph type="title"/>
+          </p:nvPr>
+        </p:nvSpPr>
+        <p:spPr>
+          <a:xfrm>
+            <a:off x="4410075" y="2560522"/>
+            <a:ext cx="3371850" cy="1736956"/>
+          </a:xfrm>
+        </p:spPr>
+        <p:txBody>
+          <a:bodyPr>
+            <a:normAutofit/>
+          </a:bodyPr>
+          <a:lstStyle/>
+          <a:p>
+            <a:pPr algn="ctr"/>
+            <a:r>
+              <a:rPr lang="pl-PL" sz="5400" dirty="0" err="1"/>
+              <a:t>Questions</a:t>
+            </a:r>
+            <a:r>
+              <a:rPr lang="pl-PL" sz="5400" dirty="0"/>
+              <a:t>?</a:t>
+            </a:r>
+          </a:p>
+        </p:txBody>
+      </p:sp>
+    </p:spTree>
+    <p:extLst>
+      <p:ext uri="{BB962C8B-B14F-4D97-AF65-F5344CB8AC3E}">
+        <p14:creationId xmlns:p14="http://schemas.microsoft.com/office/powerpoint/2010/main" val="1886228885"/>
+      </p:ext>
+    </p:extLst>
+  </p:cSld>
+  <p:clrMapOvr>
+    <a:masterClrMapping/>
+  </p:clrMapOvr>
+</p:sld>
+</file>
+
+<file path=ppt/slides/slide23.xml><?xml version="1.0" encoding="utf-8"?>
+<p:sld xmlns:a="http://schemas.openxmlformats.org/drawingml/2006/main" xmlns:r="http://schemas.openxmlformats.org/officeDocument/2006/relationships" xmlns:p="http://schemas.openxmlformats.org/presentationml/2006/main">
+  <p:cSld>
     <p:bg>
       <p:bgPr>
         <a:solidFill>
@@ -13445,7 +14299,7 @@
               </a:spcAft>
             </a:pPr>
             <a:r>
-              <a:rPr lang="en-US" sz="4400" b="1" kern="1200" dirty="0" err="1">
+              <a:rPr lang="pl-PL" sz="4400" b="1" dirty="0" err="1">
                 <a:solidFill>
                   <a:srgbClr val="FFFFFF"/>
                 </a:solidFill>
@@ -13453,10 +14307,10 @@
                 <a:ea typeface="+mj-ea"/>
                 <a:cs typeface="+mj-cs"/>
               </a:rPr>
-              <a:t>Zapisy</a:t>
-            </a:r>
-            <a:r>
-              <a:rPr lang="en-US" sz="4400" b="1" kern="1200" dirty="0">
+              <a:t>Join</a:t>
+            </a:r>
+            <a:r>
+              <a:rPr lang="pl-PL" sz="4400" b="1" dirty="0">
                 <a:solidFill>
                   <a:srgbClr val="FFFFFF"/>
                 </a:solidFill>
@@ -13464,10 +14318,10 @@
                 <a:ea typeface="+mj-ea"/>
                 <a:cs typeface="+mj-cs"/>
               </a:rPr>
-              <a:t> do </a:t>
-            </a:r>
-            <a:r>
-              <a:rPr lang="en-US" sz="4400" b="1" kern="1200" dirty="0" err="1">
+              <a:t> </a:t>
+            </a:r>
+            <a:r>
+              <a:rPr lang="pl-PL" sz="4400" b="1" dirty="0" err="1">
                 <a:solidFill>
                   <a:srgbClr val="FFFFFF"/>
                 </a:solidFill>
@@ -13475,7 +14329,29 @@
                 <a:ea typeface="+mj-ea"/>
                 <a:cs typeface="+mj-cs"/>
               </a:rPr>
-              <a:t>Koła</a:t>
+              <a:t>our</a:t>
+            </a:r>
+            <a:r>
+              <a:rPr lang="pl-PL" sz="4400" b="1" dirty="0">
+                <a:solidFill>
+                  <a:srgbClr val="FFFFFF"/>
+                </a:solidFill>
+                <a:latin typeface="+mj-lt"/>
+                <a:ea typeface="+mj-ea"/>
+                <a:cs typeface="+mj-cs"/>
+              </a:rPr>
+              <a:t> </a:t>
+            </a:r>
+            <a:r>
+              <a:rPr lang="pl-PL" sz="4400" b="1" dirty="0" err="1">
+                <a:solidFill>
+                  <a:srgbClr val="FFFFFF"/>
+                </a:solidFill>
+                <a:latin typeface="+mj-lt"/>
+                <a:ea typeface="+mj-ea"/>
+                <a:cs typeface="+mj-cs"/>
+              </a:rPr>
+              <a:t>community</a:t>
             </a:r>
             <a:endParaRPr lang="en-US" sz="4400" b="1" kern="1200" dirty="0">
               <a:solidFill>
@@ -13574,7 +14450,7 @@
 </p:sld>
 </file>
 
-<file path=ppt/slides/slide21.xml><?xml version="1.0" encoding="utf-8"?>
+<file path=ppt/slides/slide24.xml><?xml version="1.0" encoding="utf-8"?>
 <p:sld xmlns:a="http://schemas.openxmlformats.org/drawingml/2006/main" xmlns:r="http://schemas.openxmlformats.org/officeDocument/2006/relationships" xmlns:p="http://schemas.openxmlformats.org/presentationml/2006/main">
   <p:cSld>
     <p:bg>
@@ -16037,6 +16913,77 @@
 <file path=ppt/slides/slide8.xml><?xml version="1.0" encoding="utf-8"?>
 <p:sld xmlns:a="http://schemas.openxmlformats.org/drawingml/2006/main" xmlns:r="http://schemas.openxmlformats.org/officeDocument/2006/relationships" xmlns:p="http://schemas.openxmlformats.org/presentationml/2006/main">
   <p:cSld>
+    <p:spTree>
+      <p:nvGrpSpPr>
+        <p:cNvPr id="1" name=""/>
+        <p:cNvGrpSpPr/>
+        <p:nvPr/>
+      </p:nvGrpSpPr>
+      <p:grpSpPr>
+        <a:xfrm>
+          <a:off x="0" y="0"/>
+          <a:ext cx="0" cy="0"/>
+          <a:chOff x="0" y="0"/>
+          <a:chExt cx="0" cy="0"/>
+        </a:xfrm>
+      </p:grpSpPr>
+      <p:sp>
+        <p:nvSpPr>
+          <p:cNvPr id="2" name="Tytuł 1">
+            <a:extLst>
+              <a:ext uri="{FF2B5EF4-FFF2-40B4-BE49-F238E27FC236}">
+                <a16:creationId xmlns:a16="http://schemas.microsoft.com/office/drawing/2014/main" id="{04A9D6AC-BEBF-1999-6D14-B3971644E4E6}"/>
+              </a:ext>
+            </a:extLst>
+          </p:cNvPr>
+          <p:cNvSpPr>
+            <a:spLocks noGrp="1"/>
+          </p:cNvSpPr>
+          <p:nvPr>
+            <p:ph type="title"/>
+          </p:nvPr>
+        </p:nvSpPr>
+        <p:spPr>
+          <a:xfrm>
+            <a:off x="838200" y="2766218"/>
+            <a:ext cx="10515600" cy="1325563"/>
+          </a:xfrm>
+        </p:spPr>
+        <p:txBody>
+          <a:bodyPr/>
+          <a:lstStyle/>
+          <a:p>
+            <a:r>
+              <a:rPr lang="pl-PL" dirty="0"/>
+              <a:t>Programming </a:t>
+            </a:r>
+            <a:r>
+              <a:rPr lang="pl-PL" dirty="0" err="1"/>
+              <a:t>languages</a:t>
+            </a:r>
+            <a:r>
+              <a:rPr lang="pl-PL" dirty="0"/>
+              <a:t> for Machine Learning</a:t>
+            </a:r>
+          </a:p>
+        </p:txBody>
+      </p:sp>
+    </p:spTree>
+    <p:extLst>
+      <p:ext uri="{BB962C8B-B14F-4D97-AF65-F5344CB8AC3E}">
+        <p14:creationId xmlns:p14="http://schemas.microsoft.com/office/powerpoint/2010/main" val="3586566437"/>
+      </p:ext>
+    </p:extLst>
+  </p:cSld>
+  <p:clrMapOvr>
+    <a:masterClrMapping/>
+  </p:clrMapOvr>
+</p:sld>
+</file>
+
+<file path=ppt/slides/slide9.xml><?xml version="1.0" encoding="utf-8"?>
+<p:sld xmlns:a="http://schemas.openxmlformats.org/drawingml/2006/main" xmlns:r="http://schemas.openxmlformats.org/officeDocument/2006/relationships" xmlns:p="http://schemas.openxmlformats.org/presentationml/2006/main">
+  <p:cSld>
     <p:bg>
       <p:bgPr>
         <a:solidFill>
@@ -16773,757 +17720,6 @@
     <p:extLst>
       <p:ext uri="{BB962C8B-B14F-4D97-AF65-F5344CB8AC3E}">
         <p14:creationId xmlns:p14="http://schemas.microsoft.com/office/powerpoint/2010/main" val="3656569641"/>
-      </p:ext>
-    </p:extLst>
-  </p:cSld>
-  <p:clrMapOvr>
-    <a:masterClrMapping/>
-  </p:clrMapOvr>
-</p:sld>
-</file>
-
-<file path=ppt/slides/slide9.xml><?xml version="1.0" encoding="utf-8"?>
-<p:sld xmlns:a="http://schemas.openxmlformats.org/drawingml/2006/main" xmlns:r="http://schemas.openxmlformats.org/officeDocument/2006/relationships" xmlns:p="http://schemas.openxmlformats.org/presentationml/2006/main">
-  <p:cSld>
-    <p:bg>
-      <p:bgPr>
-        <a:solidFill>
-          <a:schemeClr val="bg1"/>
-        </a:solidFill>
-        <a:effectLst/>
-      </p:bgPr>
-    </p:bg>
-    <p:spTree>
-      <p:nvGrpSpPr>
-        <p:cNvPr id="1" name="">
-          <a:extLst>
-            <a:ext uri="{FF2B5EF4-FFF2-40B4-BE49-F238E27FC236}">
-              <a16:creationId xmlns:a16="http://schemas.microsoft.com/office/drawing/2014/main" id="{37E009D5-DBC0-46EC-BCE5-DE2CF81CF928}"/>
-            </a:ext>
-          </a:extLst>
-        </p:cNvPr>
-        <p:cNvGrpSpPr/>
-        <p:nvPr/>
-      </p:nvGrpSpPr>
-      <p:grpSpPr>
-        <a:xfrm>
-          <a:off x="0" y="0"/>
-          <a:ext cx="0" cy="0"/>
-          <a:chOff x="0" y="0"/>
-          <a:chExt cx="0" cy="0"/>
-        </a:xfrm>
-      </p:grpSpPr>
-      <p:sp useBgFill="1">
-        <p:nvSpPr>
-          <p:cNvPr id="16" name="Rectangle 15">
-            <a:extLst>
-              <a:ext uri="{FF2B5EF4-FFF2-40B4-BE49-F238E27FC236}">
-                <a16:creationId xmlns:a16="http://schemas.microsoft.com/office/drawing/2014/main" id="{190D5A80-9469-3B61-4719-24C3F0F95F0C}"/>
-              </a:ext>
-              <a:ext uri="{C183D7F6-B498-43B3-948B-1728B52AA6E4}">
-                <adec:decorative xmlns:adec="http://schemas.microsoft.com/office/drawing/2017/decorative" val="1"/>
-              </a:ext>
-            </a:extLst>
-          </p:cNvPr>
-          <p:cNvSpPr>
-            <a:spLocks noGrp="1" noRot="1" noChangeAspect="1" noMove="1" noResize="1" noEditPoints="1" noAdjustHandles="1" noChangeArrowheads="1" noChangeShapeType="1" noTextEdit="1"/>
-          </p:cNvSpPr>
-          <p:nvPr>
-            <p:extLst>
-              <p:ext uri="{386F3935-93C4-4BCD-93E2-E3B085C9AB24}">
-                <p16:designElem xmlns:p16="http://schemas.microsoft.com/office/powerpoint/2015/main" val="1"/>
-              </p:ext>
-            </p:extLst>
-          </p:nvPr>
-        </p:nvSpPr>
-        <p:spPr>
-          <a:xfrm>
-            <a:off x="0" y="0"/>
-            <a:ext cx="12192000" cy="6858000"/>
-          </a:xfrm>
-          <a:prstGeom prst="rect">
-            <a:avLst/>
-          </a:prstGeom>
-          <a:ln w="12700" cap="flat" cmpd="sng" algn="ctr">
-            <a:noFill/>
-            <a:prstDash val="solid"/>
-            <a:miter lim="800000"/>
-          </a:ln>
-          <a:effectLst/>
-          <a:extLst>
-            <a:ext uri="{91240B29-F687-4F45-9708-019B960494DF}">
-              <a14:hiddenLine xmlns:a14="http://schemas.microsoft.com/office/drawing/2010/main" w="12700" cap="flat" cmpd="sng" algn="ctr">
-                <a:solidFill>
-                  <a:schemeClr val="accent1">
-                    <a:shade val="50000"/>
-                  </a:schemeClr>
-                </a:solidFill>
-                <a:prstDash val="solid"/>
-                <a:miter lim="800000"/>
-              </a14:hiddenLine>
-            </a:ext>
-          </a:extLst>
-        </p:spPr>
-        <p:style>
-          <a:lnRef idx="2">
-            <a:schemeClr val="accent1">
-              <a:shade val="50000"/>
-            </a:schemeClr>
-          </a:lnRef>
-          <a:fillRef idx="1">
-            <a:schemeClr val="accent1"/>
-          </a:fillRef>
-          <a:effectRef idx="0">
-            <a:schemeClr val="accent1"/>
-          </a:effectRef>
-          <a:fontRef idx="minor">
-            <a:schemeClr val="lt1"/>
-          </a:fontRef>
-        </p:style>
-        <p:txBody>
-          <a:bodyPr rtlCol="0" anchor="ctr"/>
-          <a:lstStyle/>
-          <a:p>
-            <a:pPr algn="ctr"/>
-            <a:endParaRPr lang="en-US"/>
-          </a:p>
-        </p:txBody>
-      </p:sp>
-      <p:sp>
-        <p:nvSpPr>
-          <p:cNvPr id="18" name="Rectangle 17">
-            <a:extLst>
-              <a:ext uri="{FF2B5EF4-FFF2-40B4-BE49-F238E27FC236}">
-                <a16:creationId xmlns:a16="http://schemas.microsoft.com/office/drawing/2014/main" id="{0EEF37A6-0233-E467-9355-0836E8DAC04B}"/>
-              </a:ext>
-              <a:ext uri="{C183D7F6-B498-43B3-948B-1728B52AA6E4}">
-                <adec:decorative xmlns:adec="http://schemas.microsoft.com/office/drawing/2017/decorative" val="1"/>
-              </a:ext>
-            </a:extLst>
-          </p:cNvPr>
-          <p:cNvSpPr>
-            <a:spLocks noGrp="1" noRot="1" noChangeAspect="1" noMove="1" noResize="1" noEditPoints="1" noAdjustHandles="1" noChangeArrowheads="1" noChangeShapeType="1" noTextEdit="1"/>
-          </p:cNvSpPr>
-          <p:nvPr>
-            <p:extLst>
-              <p:ext uri="{386F3935-93C4-4BCD-93E2-E3B085C9AB24}">
-                <p16:designElem xmlns:p16="http://schemas.microsoft.com/office/powerpoint/2015/main" val="1"/>
-              </p:ext>
-            </p:extLst>
-          </p:nvPr>
-        </p:nvSpPr>
-        <p:spPr>
-          <a:xfrm flipH="1">
-            <a:off x="2" y="0"/>
-            <a:ext cx="12191998" cy="1575955"/>
-          </a:xfrm>
-          <a:prstGeom prst="rect">
-            <a:avLst/>
-          </a:prstGeom>
-          <a:gradFill>
-            <a:gsLst>
-              <a:gs pos="0">
-                <a:srgbClr val="000000">
-                  <a:alpha val="96000"/>
-                </a:srgbClr>
-              </a:gs>
-              <a:gs pos="100000">
-                <a:schemeClr val="accent1">
-                  <a:lumMod val="75000"/>
-                </a:schemeClr>
-              </a:gs>
-            </a:gsLst>
-            <a:lin ang="8400000" scaled="0"/>
-          </a:gradFill>
-          <a:ln>
-            <a:noFill/>
-          </a:ln>
-        </p:spPr>
-        <p:style>
-          <a:lnRef idx="2">
-            <a:schemeClr val="accent1">
-              <a:shade val="50000"/>
-            </a:schemeClr>
-          </a:lnRef>
-          <a:fillRef idx="1">
-            <a:schemeClr val="accent1"/>
-          </a:fillRef>
-          <a:effectRef idx="0">
-            <a:schemeClr val="accent1"/>
-          </a:effectRef>
-          <a:fontRef idx="minor">
-            <a:schemeClr val="lt1"/>
-          </a:fontRef>
-        </p:style>
-        <p:txBody>
-          <a:bodyPr rtlCol="0" anchor="ctr"/>
-          <a:lstStyle/>
-          <a:p>
-            <a:pPr algn="ctr"/>
-            <a:endParaRPr lang="en-US"/>
-          </a:p>
-        </p:txBody>
-      </p:sp>
-      <p:sp>
-        <p:nvSpPr>
-          <p:cNvPr id="13" name="Rectangle 12">
-            <a:extLst>
-              <a:ext uri="{FF2B5EF4-FFF2-40B4-BE49-F238E27FC236}">
-                <a16:creationId xmlns:a16="http://schemas.microsoft.com/office/drawing/2014/main" id="{43A04EB5-AE67-FE7E-DD08-AA3C796774E1}"/>
-              </a:ext>
-              <a:ext uri="{C183D7F6-B498-43B3-948B-1728B52AA6E4}">
-                <adec:decorative xmlns:adec="http://schemas.microsoft.com/office/drawing/2017/decorative" val="1"/>
-              </a:ext>
-            </a:extLst>
-          </p:cNvPr>
-          <p:cNvSpPr>
-            <a:spLocks noGrp="1" noRot="1" noChangeAspect="1" noMove="1" noResize="1" noEditPoints="1" noAdjustHandles="1" noChangeArrowheads="1" noChangeShapeType="1" noTextEdit="1"/>
-          </p:cNvSpPr>
-          <p:nvPr>
-            <p:extLst>
-              <p:ext uri="{386F3935-93C4-4BCD-93E2-E3B085C9AB24}">
-                <p16:designElem xmlns:p16="http://schemas.microsoft.com/office/powerpoint/2015/main" val="1"/>
-              </p:ext>
-            </p:extLst>
-          </p:nvPr>
-        </p:nvSpPr>
-        <p:spPr>
-          <a:xfrm rot="10800000" flipH="1">
-            <a:off x="8128857" y="0"/>
-            <a:ext cx="4063143" cy="1576412"/>
-          </a:xfrm>
-          <a:prstGeom prst="rect">
-            <a:avLst/>
-          </a:prstGeom>
-          <a:gradFill>
-            <a:gsLst>
-              <a:gs pos="19000">
-                <a:schemeClr val="accent1">
-                  <a:lumMod val="50000"/>
-                  <a:alpha val="68000"/>
-                </a:schemeClr>
-              </a:gs>
-              <a:gs pos="100000">
-                <a:schemeClr val="accent1">
-                  <a:alpha val="79000"/>
-                </a:schemeClr>
-              </a:gs>
-            </a:gsLst>
-            <a:lin ang="19200000" scaled="0"/>
-          </a:gradFill>
-          <a:ln>
-            <a:noFill/>
-          </a:ln>
-        </p:spPr>
-        <p:style>
-          <a:lnRef idx="2">
-            <a:schemeClr val="accent1">
-              <a:shade val="50000"/>
-            </a:schemeClr>
-          </a:lnRef>
-          <a:fillRef idx="1">
-            <a:schemeClr val="accent1"/>
-          </a:fillRef>
-          <a:effectRef idx="0">
-            <a:schemeClr val="accent1"/>
-          </a:effectRef>
-          <a:fontRef idx="minor">
-            <a:schemeClr val="lt1"/>
-          </a:fontRef>
-        </p:style>
-        <p:txBody>
-          <a:bodyPr rtlCol="0" anchor="ctr"/>
-          <a:lstStyle/>
-          <a:p>
-            <a:pPr algn="ctr"/>
-            <a:endParaRPr lang="en-US"/>
-          </a:p>
-        </p:txBody>
-      </p:sp>
-      <p:sp>
-        <p:nvSpPr>
-          <p:cNvPr id="14" name="Rectangle 13">
-            <a:extLst>
-              <a:ext uri="{FF2B5EF4-FFF2-40B4-BE49-F238E27FC236}">
-                <a16:creationId xmlns:a16="http://schemas.microsoft.com/office/drawing/2014/main" id="{BAD14623-97C3-9C05-488A-CD052C49AC66}"/>
-              </a:ext>
-              <a:ext uri="{C183D7F6-B498-43B3-948B-1728B52AA6E4}">
-                <adec:decorative xmlns:adec="http://schemas.microsoft.com/office/drawing/2017/decorative" val="1"/>
-              </a:ext>
-            </a:extLst>
-          </p:cNvPr>
-          <p:cNvSpPr>
-            <a:spLocks noGrp="1" noRot="1" noChangeAspect="1" noMove="1" noResize="1" noEditPoints="1" noAdjustHandles="1" noChangeArrowheads="1" noChangeShapeType="1" noTextEdit="1"/>
-          </p:cNvSpPr>
-          <p:nvPr>
-            <p:extLst>
-              <p:ext uri="{386F3935-93C4-4BCD-93E2-E3B085C9AB24}">
-                <p16:designElem xmlns:p16="http://schemas.microsoft.com/office/powerpoint/2015/main" val="1"/>
-              </p:ext>
-            </p:extLst>
-          </p:nvPr>
-        </p:nvSpPr>
-        <p:spPr>
-          <a:xfrm rot="5400000">
-            <a:off x="5307777" y="-5307778"/>
-            <a:ext cx="1576446" cy="12192002"/>
-          </a:xfrm>
-          <a:prstGeom prst="rect">
-            <a:avLst/>
-          </a:prstGeom>
-          <a:gradFill>
-            <a:gsLst>
-              <a:gs pos="23000">
-                <a:schemeClr val="accent1">
-                  <a:alpha val="0"/>
-                </a:schemeClr>
-              </a:gs>
-              <a:gs pos="99000">
-                <a:srgbClr val="000000">
-                  <a:alpha val="74000"/>
-                </a:srgbClr>
-              </a:gs>
-            </a:gsLst>
-            <a:lin ang="20400000" scaled="0"/>
-          </a:gradFill>
-          <a:ln>
-            <a:noFill/>
-          </a:ln>
-        </p:spPr>
-        <p:style>
-          <a:lnRef idx="2">
-            <a:schemeClr val="accent1">
-              <a:shade val="50000"/>
-            </a:schemeClr>
-          </a:lnRef>
-          <a:fillRef idx="1">
-            <a:schemeClr val="accent1"/>
-          </a:fillRef>
-          <a:effectRef idx="0">
-            <a:schemeClr val="accent1"/>
-          </a:effectRef>
-          <a:fontRef idx="minor">
-            <a:schemeClr val="lt1"/>
-          </a:fontRef>
-        </p:style>
-        <p:txBody>
-          <a:bodyPr rtlCol="0" anchor="ctr"/>
-          <a:lstStyle/>
-          <a:p>
-            <a:pPr algn="ctr"/>
-            <a:endParaRPr lang="en-US"/>
-          </a:p>
-        </p:txBody>
-      </p:sp>
-      <p:sp>
-        <p:nvSpPr>
-          <p:cNvPr id="6" name="TextBox 5">
-            <a:extLst>
-              <a:ext uri="{FF2B5EF4-FFF2-40B4-BE49-F238E27FC236}">
-                <a16:creationId xmlns:a16="http://schemas.microsoft.com/office/drawing/2014/main" id="{9E851BA4-D62B-7D10-7BBF-3CF4F83F7176}"/>
-              </a:ext>
-            </a:extLst>
-          </p:cNvPr>
-          <p:cNvSpPr txBox="1"/>
-          <p:nvPr/>
-        </p:nvSpPr>
-        <p:spPr>
-          <a:xfrm>
-            <a:off x="1147661" y="357907"/>
-            <a:ext cx="10044023" cy="877729"/>
-          </a:xfrm>
-          <a:prstGeom prst="rect">
-            <a:avLst/>
-          </a:prstGeom>
-        </p:spPr>
-        <p:txBody>
-          <a:bodyPr vert="horz" lIns="91440" tIns="45720" rIns="91440" bIns="45720" rtlCol="0" anchor="ctr">
-            <a:normAutofit/>
-          </a:bodyPr>
-          <a:lstStyle/>
-          <a:p>
-            <a:pPr defTabSz="914400">
-              <a:lnSpc>
-                <a:spcPct val="90000"/>
-              </a:lnSpc>
-              <a:spcBef>
-                <a:spcPct val="0"/>
-              </a:spcBef>
-              <a:spcAft>
-                <a:spcPts val="600"/>
-              </a:spcAft>
-            </a:pPr>
-            <a:r>
-              <a:rPr lang="pl-PL" sz="4400" b="1" dirty="0" err="1">
-                <a:solidFill>
-                  <a:srgbClr val="FFFFFF"/>
-                </a:solidFill>
-                <a:latin typeface="+mj-lt"/>
-                <a:ea typeface="+mj-ea"/>
-                <a:cs typeface="+mj-cs"/>
-              </a:rPr>
-              <a:t>Jupyter</a:t>
-            </a:r>
-            <a:r>
-              <a:rPr lang="pl-PL" sz="4400" b="1" dirty="0">
-                <a:solidFill>
-                  <a:srgbClr val="FFFFFF"/>
-                </a:solidFill>
-                <a:latin typeface="+mj-lt"/>
-                <a:ea typeface="+mj-ea"/>
-                <a:cs typeface="+mj-cs"/>
-              </a:rPr>
-              <a:t> Notebook vs Google </a:t>
-            </a:r>
-            <a:r>
-              <a:rPr lang="pl-PL" sz="4400" b="1" dirty="0" err="1">
-                <a:solidFill>
-                  <a:srgbClr val="FFFFFF"/>
-                </a:solidFill>
-                <a:latin typeface="+mj-lt"/>
-                <a:ea typeface="+mj-ea"/>
-                <a:cs typeface="+mj-cs"/>
-              </a:rPr>
-              <a:t>Colab</a:t>
-            </a:r>
-            <a:endParaRPr lang="en-US" sz="4400" b="1" kern="1200" dirty="0">
-              <a:solidFill>
-                <a:srgbClr val="FFFFFF"/>
-              </a:solidFill>
-              <a:latin typeface="+mj-lt"/>
-              <a:ea typeface="+mj-ea"/>
-              <a:cs typeface="+mj-cs"/>
-            </a:endParaRPr>
-          </a:p>
-        </p:txBody>
-      </p:sp>
-      <p:sp>
-        <p:nvSpPr>
-          <p:cNvPr id="8" name="pole tekstowe 7">
-            <a:extLst>
-              <a:ext uri="{FF2B5EF4-FFF2-40B4-BE49-F238E27FC236}">
-                <a16:creationId xmlns:a16="http://schemas.microsoft.com/office/drawing/2014/main" id="{8386B39D-CEF2-CAD8-B130-C9129E26C999}"/>
-              </a:ext>
-            </a:extLst>
-          </p:cNvPr>
-          <p:cNvSpPr txBox="1"/>
-          <p:nvPr/>
-        </p:nvSpPr>
-        <p:spPr>
-          <a:xfrm>
-            <a:off x="1147661" y="3265897"/>
-            <a:ext cx="4264851" cy="1938992"/>
-          </a:xfrm>
-          <a:prstGeom prst="rect">
-            <a:avLst/>
-          </a:prstGeom>
-          <a:noFill/>
-        </p:spPr>
-        <p:txBody>
-          <a:bodyPr wrap="square" rtlCol="0">
-            <a:spAutoFit/>
-          </a:bodyPr>
-          <a:lstStyle/>
-          <a:p>
-            <a:pPr marL="342900" indent="-342900">
-              <a:buFont typeface="Arial" panose="020B0604020202020204" pitchFamily="34" charset="0"/>
-              <a:buChar char="•"/>
-            </a:pPr>
-            <a:r>
-              <a:rPr lang="pl-PL" sz="2400" dirty="0"/>
-              <a:t>Open-</a:t>
-            </a:r>
-            <a:r>
-              <a:rPr lang="pl-PL" sz="2400" dirty="0" err="1"/>
-              <a:t>source</a:t>
-            </a:r>
-            <a:endParaRPr lang="pl-PL" sz="2400" dirty="0"/>
-          </a:p>
-          <a:p>
-            <a:pPr marL="342900" indent="-342900">
-              <a:buFont typeface="Arial" panose="020B0604020202020204" pitchFamily="34" charset="0"/>
-              <a:buChar char="•"/>
-            </a:pPr>
-            <a:r>
-              <a:rPr lang="pl-PL" sz="2400" dirty="0" err="1"/>
-              <a:t>Depends</a:t>
-            </a:r>
-            <a:r>
-              <a:rPr lang="pl-PL" sz="2400" dirty="0"/>
-              <a:t> on </a:t>
-            </a:r>
-            <a:r>
-              <a:rPr lang="pl-PL" sz="2400" dirty="0" err="1"/>
-              <a:t>user’s</a:t>
-            </a:r>
-            <a:r>
-              <a:rPr lang="pl-PL" sz="2400" dirty="0"/>
-              <a:t> </a:t>
-            </a:r>
-            <a:r>
-              <a:rPr lang="pl-PL" sz="2400" dirty="0" err="1"/>
-              <a:t>resources</a:t>
-            </a:r>
-            <a:endParaRPr lang="pl-PL" sz="2400" dirty="0"/>
-          </a:p>
-          <a:p>
-            <a:pPr marL="342900" indent="-342900">
-              <a:buFont typeface="Arial" panose="020B0604020202020204" pitchFamily="34" charset="0"/>
-              <a:buChar char="•"/>
-            </a:pPr>
-            <a:r>
-              <a:rPr lang="pl-PL" sz="2400" dirty="0"/>
-              <a:t>Offline</a:t>
-            </a:r>
-          </a:p>
-          <a:p>
-            <a:pPr marL="342900" indent="-342900">
-              <a:buFont typeface="Arial" panose="020B0604020202020204" pitchFamily="34" charset="0"/>
-              <a:buChar char="•"/>
-            </a:pPr>
-            <a:r>
-              <a:rPr lang="pl-PL" sz="2400" dirty="0" err="1"/>
-              <a:t>Intuitive</a:t>
-            </a:r>
-            <a:r>
-              <a:rPr lang="pl-PL" sz="2400" dirty="0"/>
-              <a:t> UI</a:t>
-            </a:r>
-          </a:p>
-          <a:p>
-            <a:pPr marL="342900" indent="-342900">
-              <a:buFont typeface="Arial" panose="020B0604020202020204" pitchFamily="34" charset="0"/>
-              <a:buChar char="•"/>
-            </a:pPr>
-            <a:r>
-              <a:rPr lang="pl-PL" sz="2400" dirty="0" err="1"/>
-              <a:t>Needed</a:t>
-            </a:r>
-            <a:r>
-              <a:rPr lang="pl-PL" sz="2400" dirty="0"/>
-              <a:t> </a:t>
-            </a:r>
-            <a:r>
-              <a:rPr lang="pl-PL" sz="2400" dirty="0" err="1"/>
-              <a:t>configuration</a:t>
-            </a:r>
-            <a:endParaRPr lang="pl-PL" sz="2400" dirty="0"/>
-          </a:p>
-        </p:txBody>
-      </p:sp>
-      <p:sp>
-        <p:nvSpPr>
-          <p:cNvPr id="11" name="pole tekstowe 10">
-            <a:extLst>
-              <a:ext uri="{FF2B5EF4-FFF2-40B4-BE49-F238E27FC236}">
-                <a16:creationId xmlns:a16="http://schemas.microsoft.com/office/drawing/2014/main" id="{C68086AB-91E5-58F9-E778-4626EEFE5680}"/>
-              </a:ext>
-            </a:extLst>
-          </p:cNvPr>
-          <p:cNvSpPr txBox="1"/>
-          <p:nvPr/>
-        </p:nvSpPr>
-        <p:spPr>
-          <a:xfrm>
-            <a:off x="6438119" y="3265897"/>
-            <a:ext cx="5019869" cy="2308324"/>
-          </a:xfrm>
-          <a:prstGeom prst="rect">
-            <a:avLst/>
-          </a:prstGeom>
-          <a:noFill/>
-        </p:spPr>
-        <p:txBody>
-          <a:bodyPr wrap="square" rtlCol="0">
-            <a:spAutoFit/>
-          </a:bodyPr>
-          <a:lstStyle/>
-          <a:p>
-            <a:pPr marL="342900" indent="-342900">
-              <a:buFont typeface="Arial" panose="020B0604020202020204" pitchFamily="34" charset="0"/>
-              <a:buChar char="•"/>
-            </a:pPr>
-            <a:r>
-              <a:rPr lang="pl-PL" sz="2400" dirty="0"/>
-              <a:t>Limited </a:t>
-            </a:r>
-            <a:r>
-              <a:rPr lang="pl-PL" sz="2400" dirty="0" err="1"/>
-              <a:t>free</a:t>
-            </a:r>
-            <a:r>
-              <a:rPr lang="pl-PL" sz="2400" dirty="0"/>
-              <a:t> version</a:t>
-            </a:r>
-          </a:p>
-          <a:p>
-            <a:pPr marL="342900" indent="-342900">
-              <a:buFont typeface="Arial" panose="020B0604020202020204" pitchFamily="34" charset="0"/>
-              <a:buChar char="•"/>
-            </a:pPr>
-            <a:r>
-              <a:rPr lang="pl-PL" sz="2400" dirty="0" err="1"/>
-              <a:t>Cloud</a:t>
-            </a:r>
-            <a:r>
-              <a:rPr lang="pl-PL" sz="2400" dirty="0"/>
-              <a:t> </a:t>
-            </a:r>
-            <a:r>
-              <a:rPr lang="pl-PL" sz="2400" dirty="0" err="1"/>
-              <a:t>computing</a:t>
-            </a:r>
-            <a:endParaRPr lang="pl-PL" sz="2400" dirty="0"/>
-          </a:p>
-          <a:p>
-            <a:pPr marL="342900" indent="-342900">
-              <a:buFont typeface="Arial" panose="020B0604020202020204" pitchFamily="34" charset="0"/>
-              <a:buChar char="•"/>
-            </a:pPr>
-            <a:r>
-              <a:rPr lang="pl-PL" sz="2400" dirty="0" err="1"/>
-              <a:t>Intuitive</a:t>
-            </a:r>
-            <a:r>
-              <a:rPr lang="pl-PL" sz="2400" dirty="0"/>
-              <a:t> UI</a:t>
-            </a:r>
-          </a:p>
-          <a:p>
-            <a:pPr marL="342900" indent="-342900">
-              <a:buFont typeface="Arial" panose="020B0604020202020204" pitchFamily="34" charset="0"/>
-              <a:buChar char="•"/>
-            </a:pPr>
-            <a:r>
-              <a:rPr lang="pl-PL" sz="2400" dirty="0"/>
-              <a:t>Compatible with </a:t>
-            </a:r>
-            <a:r>
-              <a:rPr lang="pl-PL" sz="2400" dirty="0" err="1"/>
-              <a:t>Jupyter</a:t>
-            </a:r>
-            <a:r>
-              <a:rPr lang="pl-PL" sz="2400" dirty="0"/>
-              <a:t> </a:t>
-            </a:r>
-            <a:r>
-              <a:rPr lang="pl-PL" sz="2400" dirty="0" err="1"/>
-              <a:t>Notebooks</a:t>
-            </a:r>
-            <a:r>
-              <a:rPr lang="pl-PL" sz="2400" dirty="0"/>
-              <a:t>’ </a:t>
-            </a:r>
-            <a:r>
-              <a:rPr lang="pl-PL" sz="2400" dirty="0" err="1"/>
-              <a:t>extensions</a:t>
-            </a:r>
-            <a:endParaRPr lang="pl-PL" sz="2400" dirty="0"/>
-          </a:p>
-          <a:p>
-            <a:pPr marL="342900" indent="-342900">
-              <a:buFont typeface="Arial" panose="020B0604020202020204" pitchFamily="34" charset="0"/>
-              <a:buChar char="•"/>
-            </a:pPr>
-            <a:r>
-              <a:rPr lang="pl-PL" sz="2400" dirty="0"/>
-              <a:t>No </a:t>
-            </a:r>
-            <a:r>
-              <a:rPr lang="pl-PL" sz="2400" dirty="0" err="1"/>
-              <a:t>configuration</a:t>
-            </a:r>
-            <a:r>
-              <a:rPr lang="pl-PL" sz="2400" dirty="0"/>
-              <a:t> </a:t>
-            </a:r>
-            <a:r>
-              <a:rPr lang="pl-PL" sz="2400" dirty="0" err="1"/>
-              <a:t>need</a:t>
-            </a:r>
-            <a:endParaRPr lang="pl-PL" sz="2400" dirty="0"/>
-          </a:p>
-        </p:txBody>
-      </p:sp>
-      <p:pic>
-        <p:nvPicPr>
-          <p:cNvPr id="5" name="Grafika 4">
-            <a:extLst>
-              <a:ext uri="{FF2B5EF4-FFF2-40B4-BE49-F238E27FC236}">
-                <a16:creationId xmlns:a16="http://schemas.microsoft.com/office/drawing/2014/main" id="{399E9C5C-0CAA-7881-5E08-795F0416E457}"/>
-              </a:ext>
-            </a:extLst>
-          </p:cNvPr>
-          <p:cNvPicPr>
-            <a:picLocks noChangeAspect="1"/>
-          </p:cNvPicPr>
-          <p:nvPr/>
-        </p:nvPicPr>
-        <p:blipFill>
-          <a:blip r:embed="rId3">
-            <a:extLst>
-              <a:ext uri="{28A0092B-C50C-407E-A947-70E740481C1C}">
-                <a14:useLocalDpi xmlns:a14="http://schemas.microsoft.com/office/drawing/2010/main" val="0"/>
-              </a:ext>
-              <a:ext uri="{96DAC541-7B7A-43D3-8B79-37D633B846F1}">
-                <asvg:svgBlip xmlns:asvg="http://schemas.microsoft.com/office/drawing/2016/SVG/main" r:embed="rId4"/>
-              </a:ext>
-            </a:extLst>
-          </a:blip>
-          <a:stretch>
-            <a:fillRect/>
-          </a:stretch>
-        </p:blipFill>
-        <p:spPr>
-          <a:xfrm>
-            <a:off x="1147661" y="2304311"/>
-            <a:ext cx="2304665" cy="621894"/>
-          </a:xfrm>
-          <a:prstGeom prst="rect">
-            <a:avLst/>
-          </a:prstGeom>
-        </p:spPr>
-      </p:pic>
-      <p:pic>
-        <p:nvPicPr>
-          <p:cNvPr id="9" name="Obraz 8" descr="Obraz zawierający Czcionka, Grafika, typografia, projekt graficzny&#10;&#10;Opis wygenerowany automatycznie">
-            <a:extLst>
-              <a:ext uri="{FF2B5EF4-FFF2-40B4-BE49-F238E27FC236}">
-                <a16:creationId xmlns:a16="http://schemas.microsoft.com/office/drawing/2014/main" id="{6F2E6BF1-5ADB-EB48-5A3E-DBABA3565DF6}"/>
-              </a:ext>
-            </a:extLst>
-          </p:cNvPr>
-          <p:cNvPicPr>
-            <a:picLocks noChangeAspect="1"/>
-          </p:cNvPicPr>
-          <p:nvPr/>
-        </p:nvPicPr>
-        <p:blipFill>
-          <a:blip r:embed="rId5">
-            <a:extLst>
-              <a:ext uri="{28A0092B-C50C-407E-A947-70E740481C1C}">
-                <a14:useLocalDpi xmlns:a14="http://schemas.microsoft.com/office/drawing/2010/main" val="0"/>
-              </a:ext>
-            </a:extLst>
-          </a:blip>
-          <a:stretch>
-            <a:fillRect/>
-          </a:stretch>
-        </p:blipFill>
-        <p:spPr>
-          <a:xfrm>
-            <a:off x="6438119" y="2208481"/>
-            <a:ext cx="3442999" cy="717724"/>
-          </a:xfrm>
-          <a:prstGeom prst="rect">
-            <a:avLst/>
-          </a:prstGeom>
-        </p:spPr>
-      </p:pic>
-    </p:spTree>
-    <p:extLst>
-      <p:ext uri="{BB962C8B-B14F-4D97-AF65-F5344CB8AC3E}">
-        <p14:creationId xmlns:p14="http://schemas.microsoft.com/office/powerpoint/2010/main" val="1928103626"/>
       </p:ext>
     </p:extLst>
   </p:cSld>

</xml_diff>

<commit_message>
s6 projects and preprocessing notebook
</commit_message>
<xml_diff>
--- a/s1/1_meeting.pptx
+++ b/s1/1_meeting.pptx
@@ -2830,6 +2830,292 @@
     </pc:docChg>
   </pc:docChgLst>
   <pc:docChgLst>
+    <pc:chgData name="Katarzyna Młynarczyk" userId="S::katarzyna.mlynarczyk@student.pk.edu.pl::0899dcc6-7ddc-443b-a5f8-e372dbec5d48" providerId="AD" clId="Web-{92DD319D-B8AE-4DB7-937E-88CCAA9E9A9A}"/>
+    <pc:docChg chg="modSld sldOrd">
+      <pc:chgData name="Katarzyna Młynarczyk" userId="S::katarzyna.mlynarczyk@student.pk.edu.pl::0899dcc6-7ddc-443b-a5f8-e372dbec5d48" providerId="AD" clId="Web-{92DD319D-B8AE-4DB7-937E-88CCAA9E9A9A}" dt="2024-01-22T22:00:10.978" v="107" actId="1076"/>
+      <pc:docMkLst>
+        <pc:docMk/>
+      </pc:docMkLst>
+      <pc:sldChg chg="modSp ord">
+        <pc:chgData name="Katarzyna Młynarczyk" userId="S::katarzyna.mlynarczyk@student.pk.edu.pl::0899dcc6-7ddc-443b-a5f8-e372dbec5d48" providerId="AD" clId="Web-{92DD319D-B8AE-4DB7-937E-88CCAA9E9A9A}" dt="2024-01-22T19:52:47.713" v="78"/>
+        <pc:sldMkLst>
+          <pc:docMk/>
+          <pc:sldMk cId="942676640" sldId="286"/>
+        </pc:sldMkLst>
+        <pc:spChg chg="mod">
+          <ac:chgData name="Katarzyna Młynarczyk" userId="S::katarzyna.mlynarczyk@student.pk.edu.pl::0899dcc6-7ddc-443b-a5f8-e372dbec5d48" providerId="AD" clId="Web-{92DD319D-B8AE-4DB7-937E-88CCAA9E9A9A}" dt="2024-01-22T19:49:32.706" v="69" actId="20577"/>
+          <ac:spMkLst>
+            <pc:docMk/>
+            <pc:sldMk cId="942676640" sldId="286"/>
+            <ac:spMk id="6" creationId="{A93E78A3-8294-3D66-47B8-EEB14C1DB610}"/>
+          </ac:spMkLst>
+        </pc:spChg>
+        <pc:spChg chg="mod">
+          <ac:chgData name="Katarzyna Młynarczyk" userId="S::katarzyna.mlynarczyk@student.pk.edu.pl::0899dcc6-7ddc-443b-a5f8-e372dbec5d48" providerId="AD" clId="Web-{92DD319D-B8AE-4DB7-937E-88CCAA9E9A9A}" dt="2024-01-22T19:49:40.644" v="77" actId="20577"/>
+          <ac:spMkLst>
+            <pc:docMk/>
+            <pc:sldMk cId="942676640" sldId="286"/>
+            <ac:spMk id="7" creationId="{8F53D9CF-9E83-CE57-E4E2-50F728E5820C}"/>
+          </ac:spMkLst>
+        </pc:spChg>
+      </pc:sldChg>
+      <pc:sldChg chg="addSp delSp modSp mod setBg setClrOvrMap">
+        <pc:chgData name="Katarzyna Młynarczyk" userId="S::katarzyna.mlynarczyk@student.pk.edu.pl::0899dcc6-7ddc-443b-a5f8-e372dbec5d48" providerId="AD" clId="Web-{92DD319D-B8AE-4DB7-937E-88CCAA9E9A9A}" dt="2024-01-22T19:47:16.044" v="43"/>
+        <pc:sldMkLst>
+          <pc:docMk/>
+          <pc:sldMk cId="1445634233" sldId="290"/>
+        </pc:sldMkLst>
+        <pc:spChg chg="add del">
+          <ac:chgData name="Katarzyna Młynarczyk" userId="S::katarzyna.mlynarczyk@student.pk.edu.pl::0899dcc6-7ddc-443b-a5f8-e372dbec5d48" providerId="AD" clId="Web-{92DD319D-B8AE-4DB7-937E-88CCAA9E9A9A}" dt="2024-01-22T19:47:06.747" v="40"/>
+          <ac:spMkLst>
+            <pc:docMk/>
+            <pc:sldMk cId="1445634233" sldId="290"/>
+            <ac:spMk id="16" creationId="{E1750109-3B91-4506-B997-0CD8E35A1488}"/>
+          </ac:spMkLst>
+        </pc:spChg>
+        <pc:spChg chg="add del">
+          <ac:chgData name="Katarzyna Młynarczyk" userId="S::katarzyna.mlynarczyk@student.pk.edu.pl::0899dcc6-7ddc-443b-a5f8-e372dbec5d48" providerId="AD" clId="Web-{92DD319D-B8AE-4DB7-937E-88CCAA9E9A9A}" dt="2024-01-22T19:47:06.747" v="40"/>
+          <ac:spMkLst>
+            <pc:docMk/>
+            <pc:sldMk cId="1445634233" sldId="290"/>
+            <ac:spMk id="18" creationId="{E72D8D1B-59F6-4FF3-8547-9BBB6129F2FA}"/>
+          </ac:spMkLst>
+        </pc:spChg>
+        <pc:spChg chg="add del">
+          <ac:chgData name="Katarzyna Młynarczyk" userId="S::katarzyna.mlynarczyk@student.pk.edu.pl::0899dcc6-7ddc-443b-a5f8-e372dbec5d48" providerId="AD" clId="Web-{92DD319D-B8AE-4DB7-937E-88CCAA9E9A9A}" dt="2024-01-22T19:47:06.747" v="40"/>
+          <ac:spMkLst>
+            <pc:docMk/>
+            <pc:sldMk cId="1445634233" sldId="290"/>
+            <ac:spMk id="20" creationId="{14044C96-7CFD-44DB-A579-D77B0D37C681}"/>
+          </ac:spMkLst>
+        </pc:spChg>
+        <pc:spChg chg="add del">
+          <ac:chgData name="Katarzyna Młynarczyk" userId="S::katarzyna.mlynarczyk@student.pk.edu.pl::0899dcc6-7ddc-443b-a5f8-e372dbec5d48" providerId="AD" clId="Web-{92DD319D-B8AE-4DB7-937E-88CCAA9E9A9A}" dt="2024-01-22T19:47:06.747" v="40"/>
+          <ac:spMkLst>
+            <pc:docMk/>
+            <pc:sldMk cId="1445634233" sldId="290"/>
+            <ac:spMk id="22" creationId="{8FC8C21F-9484-4A71-ABFA-6C10682FAC3E}"/>
+          </ac:spMkLst>
+        </pc:spChg>
+        <pc:spChg chg="add del">
+          <ac:chgData name="Katarzyna Młynarczyk" userId="S::katarzyna.mlynarczyk@student.pk.edu.pl::0899dcc6-7ddc-443b-a5f8-e372dbec5d48" providerId="AD" clId="Web-{92DD319D-B8AE-4DB7-937E-88CCAA9E9A9A}" dt="2024-01-22T19:47:06.747" v="40"/>
+          <ac:spMkLst>
+            <pc:docMk/>
+            <pc:sldMk cId="1445634233" sldId="290"/>
+            <ac:spMk id="24" creationId="{2C444748-5A8D-4B53-89FE-42B455DFA2D1}"/>
+          </ac:spMkLst>
+        </pc:spChg>
+        <pc:spChg chg="add del">
+          <ac:chgData name="Katarzyna Młynarczyk" userId="S::katarzyna.mlynarczyk@student.pk.edu.pl::0899dcc6-7ddc-443b-a5f8-e372dbec5d48" providerId="AD" clId="Web-{92DD319D-B8AE-4DB7-937E-88CCAA9E9A9A}" dt="2024-01-22T19:47:06.747" v="40"/>
+          <ac:spMkLst>
+            <pc:docMk/>
+            <pc:sldMk cId="1445634233" sldId="290"/>
+            <ac:spMk id="26" creationId="{F4FFA271-A10A-4AC3-8F06-E3313A197A80}"/>
+          </ac:spMkLst>
+        </pc:spChg>
+        <pc:spChg chg="add del">
+          <ac:chgData name="Katarzyna Młynarczyk" userId="S::katarzyna.mlynarczyk@student.pk.edu.pl::0899dcc6-7ddc-443b-a5f8-e372dbec5d48" providerId="AD" clId="Web-{92DD319D-B8AE-4DB7-937E-88CCAA9E9A9A}" dt="2024-01-22T19:47:16.029" v="42"/>
+          <ac:spMkLst>
+            <pc:docMk/>
+            <pc:sldMk cId="1445634233" sldId="290"/>
+            <ac:spMk id="28" creationId="{1284CA7F-B696-4085-84C6-CD668817E685}"/>
+          </ac:spMkLst>
+        </pc:spChg>
+        <pc:spChg chg="add del">
+          <ac:chgData name="Katarzyna Młynarczyk" userId="S::katarzyna.mlynarczyk@student.pk.edu.pl::0899dcc6-7ddc-443b-a5f8-e372dbec5d48" providerId="AD" clId="Web-{92DD319D-B8AE-4DB7-937E-88CCAA9E9A9A}" dt="2024-01-22T19:47:16.029" v="42"/>
+          <ac:spMkLst>
+            <pc:docMk/>
+            <pc:sldMk cId="1445634233" sldId="290"/>
+            <ac:spMk id="29" creationId="{858A10F4-B847-4777-BC82-782F6FB36E40}"/>
+          </ac:spMkLst>
+        </pc:spChg>
+        <pc:spChg chg="add del">
+          <ac:chgData name="Katarzyna Młynarczyk" userId="S::katarzyna.mlynarczyk@student.pk.edu.pl::0899dcc6-7ddc-443b-a5f8-e372dbec5d48" providerId="AD" clId="Web-{92DD319D-B8AE-4DB7-937E-88CCAA9E9A9A}" dt="2024-01-22T19:47:16.029" v="42"/>
+          <ac:spMkLst>
+            <pc:docMk/>
+            <pc:sldMk cId="1445634233" sldId="290"/>
+            <ac:spMk id="30" creationId="{8883B597-C9A1-46EF-AB6B-71DF0B1ED4A6}"/>
+          </ac:spMkLst>
+        </pc:spChg>
+        <pc:spChg chg="add del">
+          <ac:chgData name="Katarzyna Młynarczyk" userId="S::katarzyna.mlynarczyk@student.pk.edu.pl::0899dcc6-7ddc-443b-a5f8-e372dbec5d48" providerId="AD" clId="Web-{92DD319D-B8AE-4DB7-937E-88CCAA9E9A9A}" dt="2024-01-22T19:47:16.029" v="42"/>
+          <ac:spMkLst>
+            <pc:docMk/>
+            <pc:sldMk cId="1445634233" sldId="290"/>
+            <ac:spMk id="31" creationId="{A0B38421-369F-445C-9543-5BC17BC09040}"/>
+          </ac:spMkLst>
+        </pc:spChg>
+        <pc:spChg chg="add del">
+          <ac:chgData name="Katarzyna Młynarczyk" userId="S::katarzyna.mlynarczyk@student.pk.edu.pl::0899dcc6-7ddc-443b-a5f8-e372dbec5d48" providerId="AD" clId="Web-{92DD319D-B8AE-4DB7-937E-88CCAA9E9A9A}" dt="2024-01-22T19:47:16.029" v="42"/>
+          <ac:spMkLst>
+            <pc:docMk/>
+            <pc:sldMk cId="1445634233" sldId="290"/>
+            <ac:spMk id="32" creationId="{FAA9CE81-CAF0-41E3-8E73-CAFA13A0B1A7}"/>
+          </ac:spMkLst>
+        </pc:spChg>
+        <pc:spChg chg="add">
+          <ac:chgData name="Katarzyna Młynarczyk" userId="S::katarzyna.mlynarczyk@student.pk.edu.pl::0899dcc6-7ddc-443b-a5f8-e372dbec5d48" providerId="AD" clId="Web-{92DD319D-B8AE-4DB7-937E-88CCAA9E9A9A}" dt="2024-01-22T19:47:16.044" v="43"/>
+          <ac:spMkLst>
+            <pc:docMk/>
+            <pc:sldMk cId="1445634233" sldId="290"/>
+            <ac:spMk id="34" creationId="{E1750109-3B91-4506-B997-0CD8E35A1488}"/>
+          </ac:spMkLst>
+        </pc:spChg>
+        <pc:spChg chg="add">
+          <ac:chgData name="Katarzyna Młynarczyk" userId="S::katarzyna.mlynarczyk@student.pk.edu.pl::0899dcc6-7ddc-443b-a5f8-e372dbec5d48" providerId="AD" clId="Web-{92DD319D-B8AE-4DB7-937E-88CCAA9E9A9A}" dt="2024-01-22T19:47:16.044" v="43"/>
+          <ac:spMkLst>
+            <pc:docMk/>
+            <pc:sldMk cId="1445634233" sldId="290"/>
+            <ac:spMk id="35" creationId="{E72D8D1B-59F6-4FF3-8547-9BBB6129F2FA}"/>
+          </ac:spMkLst>
+        </pc:spChg>
+        <pc:spChg chg="add">
+          <ac:chgData name="Katarzyna Młynarczyk" userId="S::katarzyna.mlynarczyk@student.pk.edu.pl::0899dcc6-7ddc-443b-a5f8-e372dbec5d48" providerId="AD" clId="Web-{92DD319D-B8AE-4DB7-937E-88CCAA9E9A9A}" dt="2024-01-22T19:47:16.044" v="43"/>
+          <ac:spMkLst>
+            <pc:docMk/>
+            <pc:sldMk cId="1445634233" sldId="290"/>
+            <ac:spMk id="36" creationId="{14044C96-7CFD-44DB-A579-D77B0D37C681}"/>
+          </ac:spMkLst>
+        </pc:spChg>
+        <pc:spChg chg="add">
+          <ac:chgData name="Katarzyna Młynarczyk" userId="S::katarzyna.mlynarczyk@student.pk.edu.pl::0899dcc6-7ddc-443b-a5f8-e372dbec5d48" providerId="AD" clId="Web-{92DD319D-B8AE-4DB7-937E-88CCAA9E9A9A}" dt="2024-01-22T19:47:16.044" v="43"/>
+          <ac:spMkLst>
+            <pc:docMk/>
+            <pc:sldMk cId="1445634233" sldId="290"/>
+            <ac:spMk id="37" creationId="{8FC8C21F-9484-4A71-ABFA-6C10682FAC3E}"/>
+          </ac:spMkLst>
+        </pc:spChg>
+        <pc:spChg chg="add">
+          <ac:chgData name="Katarzyna Młynarczyk" userId="S::katarzyna.mlynarczyk@student.pk.edu.pl::0899dcc6-7ddc-443b-a5f8-e372dbec5d48" providerId="AD" clId="Web-{92DD319D-B8AE-4DB7-937E-88CCAA9E9A9A}" dt="2024-01-22T19:47:16.044" v="43"/>
+          <ac:spMkLst>
+            <pc:docMk/>
+            <pc:sldMk cId="1445634233" sldId="290"/>
+            <ac:spMk id="38" creationId="{2C444748-5A8D-4B53-89FE-42B455DFA2D1}"/>
+          </ac:spMkLst>
+        </pc:spChg>
+        <pc:spChg chg="add">
+          <ac:chgData name="Katarzyna Młynarczyk" userId="S::katarzyna.mlynarczyk@student.pk.edu.pl::0899dcc6-7ddc-443b-a5f8-e372dbec5d48" providerId="AD" clId="Web-{92DD319D-B8AE-4DB7-937E-88CCAA9E9A9A}" dt="2024-01-22T19:47:16.044" v="43"/>
+          <ac:spMkLst>
+            <pc:docMk/>
+            <pc:sldMk cId="1445634233" sldId="290"/>
+            <ac:spMk id="39" creationId="{F4FFA271-A10A-4AC3-8F06-E3313A197A80}"/>
+          </ac:spMkLst>
+        </pc:spChg>
+        <pc:picChg chg="add mod ord">
+          <ac:chgData name="Katarzyna Młynarczyk" userId="S::katarzyna.mlynarczyk@student.pk.edu.pl::0899dcc6-7ddc-443b-a5f8-e372dbec5d48" providerId="AD" clId="Web-{92DD319D-B8AE-4DB7-937E-88CCAA9E9A9A}" dt="2024-01-22T19:47:16.044" v="43"/>
+          <ac:picMkLst>
+            <pc:docMk/>
+            <pc:sldMk cId="1445634233" sldId="290"/>
+            <ac:picMk id="2" creationId="{B60F6EEE-DD99-AC38-692E-D3A0595C755D}"/>
+          </ac:picMkLst>
+        </pc:picChg>
+        <pc:picChg chg="add mod ord">
+          <ac:chgData name="Katarzyna Młynarczyk" userId="S::katarzyna.mlynarczyk@student.pk.edu.pl::0899dcc6-7ddc-443b-a5f8-e372dbec5d48" providerId="AD" clId="Web-{92DD319D-B8AE-4DB7-937E-88CCAA9E9A9A}" dt="2024-01-22T19:47:16.044" v="43"/>
+          <ac:picMkLst>
+            <pc:docMk/>
+            <pc:sldMk cId="1445634233" sldId="290"/>
+            <ac:picMk id="3" creationId="{16DA5DAF-E7EA-EA7A-AD0F-1A9F6CB4BD6B}"/>
+          </ac:picMkLst>
+        </pc:picChg>
+        <pc:picChg chg="add del mod">
+          <ac:chgData name="Katarzyna Młynarczyk" userId="S::katarzyna.mlynarczyk@student.pk.edu.pl::0899dcc6-7ddc-443b-a5f8-e372dbec5d48" providerId="AD" clId="Web-{92DD319D-B8AE-4DB7-937E-88CCAA9E9A9A}" dt="2024-01-22T19:43:42.099" v="10"/>
+          <ac:picMkLst>
+            <pc:docMk/>
+            <pc:sldMk cId="1445634233" sldId="290"/>
+            <ac:picMk id="4" creationId="{42A75CE3-A3AB-0516-BA84-3EEF7962F68D}"/>
+          </ac:picMkLst>
+        </pc:picChg>
+        <pc:picChg chg="add del mod">
+          <ac:chgData name="Katarzyna Młynarczyk" userId="S::katarzyna.mlynarczyk@student.pk.edu.pl::0899dcc6-7ddc-443b-a5f8-e372dbec5d48" providerId="AD" clId="Web-{92DD319D-B8AE-4DB7-937E-88CCAA9E9A9A}" dt="2024-01-22T19:43:58.787" v="12"/>
+          <ac:picMkLst>
+            <pc:docMk/>
+            <pc:sldMk cId="1445634233" sldId="290"/>
+            <ac:picMk id="5" creationId="{216DA0F2-DEB3-6B0D-B50C-B1F71DE956E6}"/>
+          </ac:picMkLst>
+        </pc:picChg>
+        <pc:picChg chg="add mod ord">
+          <ac:chgData name="Katarzyna Młynarczyk" userId="S::katarzyna.mlynarczyk@student.pk.edu.pl::0899dcc6-7ddc-443b-a5f8-e372dbec5d48" providerId="AD" clId="Web-{92DD319D-B8AE-4DB7-937E-88CCAA9E9A9A}" dt="2024-01-22T19:47:16.044" v="43"/>
+          <ac:picMkLst>
+            <pc:docMk/>
+            <pc:sldMk cId="1445634233" sldId="290"/>
+            <ac:picMk id="6" creationId="{7A11C06B-4FF4-6CF9-6D9E-6BE6C40F4D44}"/>
+          </ac:picMkLst>
+        </pc:picChg>
+        <pc:picChg chg="add del mod">
+          <ac:chgData name="Katarzyna Młynarczyk" userId="S::katarzyna.mlynarczyk@student.pk.edu.pl::0899dcc6-7ddc-443b-a5f8-e372dbec5d48" providerId="AD" clId="Web-{92DD319D-B8AE-4DB7-937E-88CCAA9E9A9A}" dt="2024-01-22T19:45:18.243" v="23"/>
+          <ac:picMkLst>
+            <pc:docMk/>
+            <pc:sldMk cId="1445634233" sldId="290"/>
+            <ac:picMk id="7" creationId="{32930C75-8BC8-47B7-F5F5-5232530D6FC1}"/>
+          </ac:picMkLst>
+        </pc:picChg>
+        <pc:picChg chg="add mod">
+          <ac:chgData name="Katarzyna Młynarczyk" userId="S::katarzyna.mlynarczyk@student.pk.edu.pl::0899dcc6-7ddc-443b-a5f8-e372dbec5d48" providerId="AD" clId="Web-{92DD319D-B8AE-4DB7-937E-88CCAA9E9A9A}" dt="2024-01-22T19:47:16.044" v="43"/>
+          <ac:picMkLst>
+            <pc:docMk/>
+            <pc:sldMk cId="1445634233" sldId="290"/>
+            <ac:picMk id="8" creationId="{EA3F951F-90C2-F506-12A7-2BC3A44FD0DE}"/>
+          </ac:picMkLst>
+        </pc:picChg>
+        <pc:picChg chg="add del mod">
+          <ac:chgData name="Katarzyna Młynarczyk" userId="S::katarzyna.mlynarczyk@student.pk.edu.pl::0899dcc6-7ddc-443b-a5f8-e372dbec5d48" providerId="AD" clId="Web-{92DD319D-B8AE-4DB7-937E-88CCAA9E9A9A}" dt="2024-01-22T19:46:21.636" v="28"/>
+          <ac:picMkLst>
+            <pc:docMk/>
+            <pc:sldMk cId="1445634233" sldId="290"/>
+            <ac:picMk id="9" creationId="{CD6BB69C-795B-65EB-5AC2-38F3A051D426}"/>
+          </ac:picMkLst>
+        </pc:picChg>
+        <pc:picChg chg="add del mod">
+          <ac:chgData name="Katarzyna Młynarczyk" userId="S::katarzyna.mlynarczyk@student.pk.edu.pl::0899dcc6-7ddc-443b-a5f8-e372dbec5d48" providerId="AD" clId="Web-{92DD319D-B8AE-4DB7-937E-88CCAA9E9A9A}" dt="2024-01-22T19:46:29.089" v="33"/>
+          <ac:picMkLst>
+            <pc:docMk/>
+            <pc:sldMk cId="1445634233" sldId="290"/>
+            <ac:picMk id="10" creationId="{0E174444-85D7-1F0B-CFF0-8E43EC1619D2}"/>
+          </ac:picMkLst>
+        </pc:picChg>
+        <pc:picChg chg="add mod">
+          <ac:chgData name="Katarzyna Młynarczyk" userId="S::katarzyna.mlynarczyk@student.pk.edu.pl::0899dcc6-7ddc-443b-a5f8-e372dbec5d48" providerId="AD" clId="Web-{92DD319D-B8AE-4DB7-937E-88CCAA9E9A9A}" dt="2024-01-22T19:47:16.044" v="43"/>
+          <ac:picMkLst>
+            <pc:docMk/>
+            <pc:sldMk cId="1445634233" sldId="290"/>
+            <ac:picMk id="11" creationId="{68D66FDA-5B0F-A009-485B-0E02BE84E648}"/>
+          </ac:picMkLst>
+        </pc:picChg>
+      </pc:sldChg>
+      <pc:sldChg chg="addSp delSp modSp">
+        <pc:chgData name="Katarzyna Młynarczyk" userId="S::katarzyna.mlynarczyk@student.pk.edu.pl::0899dcc6-7ddc-443b-a5f8-e372dbec5d48" providerId="AD" clId="Web-{92DD319D-B8AE-4DB7-937E-88CCAA9E9A9A}" dt="2024-01-22T22:00:10.978" v="107" actId="1076"/>
+        <pc:sldMkLst>
+          <pc:docMk/>
+          <pc:sldMk cId="1409292011" sldId="291"/>
+        </pc:sldMkLst>
+        <pc:spChg chg="add del mod">
+          <ac:chgData name="Katarzyna Młynarczyk" userId="S::katarzyna.mlynarczyk@student.pk.edu.pl::0899dcc6-7ddc-443b-a5f8-e372dbec5d48" providerId="AD" clId="Web-{92DD319D-B8AE-4DB7-937E-88CCAA9E9A9A}" dt="2024-01-22T20:08:34.671" v="105"/>
+          <ac:spMkLst>
+            <pc:docMk/>
+            <pc:sldMk cId="1409292011" sldId="291"/>
+            <ac:spMk id="4" creationId="{E24FE2A5-23A3-98A4-A21E-D2A770EB4CA6}"/>
+          </ac:spMkLst>
+        </pc:spChg>
+        <pc:picChg chg="add mod">
+          <ac:chgData name="Katarzyna Młynarczyk" userId="S::katarzyna.mlynarczyk@student.pk.edu.pl::0899dcc6-7ddc-443b-a5f8-e372dbec5d48" providerId="AD" clId="Web-{92DD319D-B8AE-4DB7-937E-88CCAA9E9A9A}" dt="2024-01-22T22:00:10.978" v="107" actId="1076"/>
+          <ac:picMkLst>
+            <pc:docMk/>
+            <pc:sldMk cId="1409292011" sldId="291"/>
+            <ac:picMk id="2" creationId="{EC79BA18-A332-CAAF-8773-E9C755BA39F7}"/>
+          </ac:picMkLst>
+        </pc:picChg>
+        <pc:picChg chg="add mod">
+          <ac:chgData name="Katarzyna Młynarczyk" userId="S::katarzyna.mlynarczyk@student.pk.edu.pl::0899dcc6-7ddc-443b-a5f8-e372dbec5d48" providerId="AD" clId="Web-{92DD319D-B8AE-4DB7-937E-88CCAA9E9A9A}" dt="2024-01-22T20:07:58.701" v="94" actId="1076"/>
+          <ac:picMkLst>
+            <pc:docMk/>
+            <pc:sldMk cId="1409292011" sldId="291"/>
+            <ac:picMk id="3" creationId="{8091DC61-F0D6-74D5-C451-E5EE1F626F10}"/>
+          </ac:picMkLst>
+        </pc:picChg>
+      </pc:sldChg>
+    </pc:docChg>
+  </pc:docChgLst>
+  <pc:docChgLst>
     <pc:chgData name="Lisa Fretschel" userId="S::lisa.fretschel@student.pk.edu.pl::abaaee10-7fa8-4a55-9538-903ecfe0c51a" providerId="AD" clId="Web-{3A5663C4-3DAD-2A70-34E1-8464C544EBF1}"/>
     <pc:docChg chg="modSld">
       <pc:chgData name="Lisa Fretschel" userId="S::lisa.fretschel@student.pk.edu.pl::abaaee10-7fa8-4a55-9538-903ecfe0c51a" providerId="AD" clId="Web-{3A5663C4-3DAD-2A70-34E1-8464C544EBF1}" dt="2024-01-21T21:44:16.891" v="2" actId="14100"/>
@@ -2866,292 +3152,6 @@
             <ac:spMk id="30" creationId="{F80852FC-F12F-8534-C490-68CC3485B5CA}"/>
           </ac:spMkLst>
         </pc:spChg>
-      </pc:sldChg>
-    </pc:docChg>
-  </pc:docChgLst>
-  <pc:docChgLst>
-    <pc:chgData name="Katarzyna Młynarczyk" userId="S::katarzyna.mlynarczyk@student.pk.edu.pl::0899dcc6-7ddc-443b-a5f8-e372dbec5d48" providerId="AD" clId="Web-{92DD319D-B8AE-4DB7-937E-88CCAA9E9A9A}"/>
-    <pc:docChg chg="modSld sldOrd">
-      <pc:chgData name="Katarzyna Młynarczyk" userId="S::katarzyna.mlynarczyk@student.pk.edu.pl::0899dcc6-7ddc-443b-a5f8-e372dbec5d48" providerId="AD" clId="Web-{92DD319D-B8AE-4DB7-937E-88CCAA9E9A9A}" dt="2024-01-22T22:00:10.978" v="107" actId="1076"/>
-      <pc:docMkLst>
-        <pc:docMk/>
-      </pc:docMkLst>
-      <pc:sldChg chg="modSp ord">
-        <pc:chgData name="Katarzyna Młynarczyk" userId="S::katarzyna.mlynarczyk@student.pk.edu.pl::0899dcc6-7ddc-443b-a5f8-e372dbec5d48" providerId="AD" clId="Web-{92DD319D-B8AE-4DB7-937E-88CCAA9E9A9A}" dt="2024-01-22T19:52:47.713" v="78"/>
-        <pc:sldMkLst>
-          <pc:docMk/>
-          <pc:sldMk cId="942676640" sldId="286"/>
-        </pc:sldMkLst>
-        <pc:spChg chg="mod">
-          <ac:chgData name="Katarzyna Młynarczyk" userId="S::katarzyna.mlynarczyk@student.pk.edu.pl::0899dcc6-7ddc-443b-a5f8-e372dbec5d48" providerId="AD" clId="Web-{92DD319D-B8AE-4DB7-937E-88CCAA9E9A9A}" dt="2024-01-22T19:49:32.706" v="69" actId="20577"/>
-          <ac:spMkLst>
-            <pc:docMk/>
-            <pc:sldMk cId="942676640" sldId="286"/>
-            <ac:spMk id="6" creationId="{A93E78A3-8294-3D66-47B8-EEB14C1DB610}"/>
-          </ac:spMkLst>
-        </pc:spChg>
-        <pc:spChg chg="mod">
-          <ac:chgData name="Katarzyna Młynarczyk" userId="S::katarzyna.mlynarczyk@student.pk.edu.pl::0899dcc6-7ddc-443b-a5f8-e372dbec5d48" providerId="AD" clId="Web-{92DD319D-B8AE-4DB7-937E-88CCAA9E9A9A}" dt="2024-01-22T19:49:40.644" v="77" actId="20577"/>
-          <ac:spMkLst>
-            <pc:docMk/>
-            <pc:sldMk cId="942676640" sldId="286"/>
-            <ac:spMk id="7" creationId="{8F53D9CF-9E83-CE57-E4E2-50F728E5820C}"/>
-          </ac:spMkLst>
-        </pc:spChg>
-      </pc:sldChg>
-      <pc:sldChg chg="addSp delSp modSp mod setBg setClrOvrMap">
-        <pc:chgData name="Katarzyna Młynarczyk" userId="S::katarzyna.mlynarczyk@student.pk.edu.pl::0899dcc6-7ddc-443b-a5f8-e372dbec5d48" providerId="AD" clId="Web-{92DD319D-B8AE-4DB7-937E-88CCAA9E9A9A}" dt="2024-01-22T19:47:16.044" v="43"/>
-        <pc:sldMkLst>
-          <pc:docMk/>
-          <pc:sldMk cId="1445634233" sldId="290"/>
-        </pc:sldMkLst>
-        <pc:spChg chg="add del">
-          <ac:chgData name="Katarzyna Młynarczyk" userId="S::katarzyna.mlynarczyk@student.pk.edu.pl::0899dcc6-7ddc-443b-a5f8-e372dbec5d48" providerId="AD" clId="Web-{92DD319D-B8AE-4DB7-937E-88CCAA9E9A9A}" dt="2024-01-22T19:47:06.747" v="40"/>
-          <ac:spMkLst>
-            <pc:docMk/>
-            <pc:sldMk cId="1445634233" sldId="290"/>
-            <ac:spMk id="16" creationId="{E1750109-3B91-4506-B997-0CD8E35A1488}"/>
-          </ac:spMkLst>
-        </pc:spChg>
-        <pc:spChg chg="add del">
-          <ac:chgData name="Katarzyna Młynarczyk" userId="S::katarzyna.mlynarczyk@student.pk.edu.pl::0899dcc6-7ddc-443b-a5f8-e372dbec5d48" providerId="AD" clId="Web-{92DD319D-B8AE-4DB7-937E-88CCAA9E9A9A}" dt="2024-01-22T19:47:06.747" v="40"/>
-          <ac:spMkLst>
-            <pc:docMk/>
-            <pc:sldMk cId="1445634233" sldId="290"/>
-            <ac:spMk id="18" creationId="{E72D8D1B-59F6-4FF3-8547-9BBB6129F2FA}"/>
-          </ac:spMkLst>
-        </pc:spChg>
-        <pc:spChg chg="add del">
-          <ac:chgData name="Katarzyna Młynarczyk" userId="S::katarzyna.mlynarczyk@student.pk.edu.pl::0899dcc6-7ddc-443b-a5f8-e372dbec5d48" providerId="AD" clId="Web-{92DD319D-B8AE-4DB7-937E-88CCAA9E9A9A}" dt="2024-01-22T19:47:06.747" v="40"/>
-          <ac:spMkLst>
-            <pc:docMk/>
-            <pc:sldMk cId="1445634233" sldId="290"/>
-            <ac:spMk id="20" creationId="{14044C96-7CFD-44DB-A579-D77B0D37C681}"/>
-          </ac:spMkLst>
-        </pc:spChg>
-        <pc:spChg chg="add del">
-          <ac:chgData name="Katarzyna Młynarczyk" userId="S::katarzyna.mlynarczyk@student.pk.edu.pl::0899dcc6-7ddc-443b-a5f8-e372dbec5d48" providerId="AD" clId="Web-{92DD319D-B8AE-4DB7-937E-88CCAA9E9A9A}" dt="2024-01-22T19:47:06.747" v="40"/>
-          <ac:spMkLst>
-            <pc:docMk/>
-            <pc:sldMk cId="1445634233" sldId="290"/>
-            <ac:spMk id="22" creationId="{8FC8C21F-9484-4A71-ABFA-6C10682FAC3E}"/>
-          </ac:spMkLst>
-        </pc:spChg>
-        <pc:spChg chg="add del">
-          <ac:chgData name="Katarzyna Młynarczyk" userId="S::katarzyna.mlynarczyk@student.pk.edu.pl::0899dcc6-7ddc-443b-a5f8-e372dbec5d48" providerId="AD" clId="Web-{92DD319D-B8AE-4DB7-937E-88CCAA9E9A9A}" dt="2024-01-22T19:47:06.747" v="40"/>
-          <ac:spMkLst>
-            <pc:docMk/>
-            <pc:sldMk cId="1445634233" sldId="290"/>
-            <ac:spMk id="24" creationId="{2C444748-5A8D-4B53-89FE-42B455DFA2D1}"/>
-          </ac:spMkLst>
-        </pc:spChg>
-        <pc:spChg chg="add del">
-          <ac:chgData name="Katarzyna Młynarczyk" userId="S::katarzyna.mlynarczyk@student.pk.edu.pl::0899dcc6-7ddc-443b-a5f8-e372dbec5d48" providerId="AD" clId="Web-{92DD319D-B8AE-4DB7-937E-88CCAA9E9A9A}" dt="2024-01-22T19:47:06.747" v="40"/>
-          <ac:spMkLst>
-            <pc:docMk/>
-            <pc:sldMk cId="1445634233" sldId="290"/>
-            <ac:spMk id="26" creationId="{F4FFA271-A10A-4AC3-8F06-E3313A197A80}"/>
-          </ac:spMkLst>
-        </pc:spChg>
-        <pc:spChg chg="add del">
-          <ac:chgData name="Katarzyna Młynarczyk" userId="S::katarzyna.mlynarczyk@student.pk.edu.pl::0899dcc6-7ddc-443b-a5f8-e372dbec5d48" providerId="AD" clId="Web-{92DD319D-B8AE-4DB7-937E-88CCAA9E9A9A}" dt="2024-01-22T19:47:16.029" v="42"/>
-          <ac:spMkLst>
-            <pc:docMk/>
-            <pc:sldMk cId="1445634233" sldId="290"/>
-            <ac:spMk id="28" creationId="{1284CA7F-B696-4085-84C6-CD668817E685}"/>
-          </ac:spMkLst>
-        </pc:spChg>
-        <pc:spChg chg="add del">
-          <ac:chgData name="Katarzyna Młynarczyk" userId="S::katarzyna.mlynarczyk@student.pk.edu.pl::0899dcc6-7ddc-443b-a5f8-e372dbec5d48" providerId="AD" clId="Web-{92DD319D-B8AE-4DB7-937E-88CCAA9E9A9A}" dt="2024-01-22T19:47:16.029" v="42"/>
-          <ac:spMkLst>
-            <pc:docMk/>
-            <pc:sldMk cId="1445634233" sldId="290"/>
-            <ac:spMk id="29" creationId="{858A10F4-B847-4777-BC82-782F6FB36E40}"/>
-          </ac:spMkLst>
-        </pc:spChg>
-        <pc:spChg chg="add del">
-          <ac:chgData name="Katarzyna Młynarczyk" userId="S::katarzyna.mlynarczyk@student.pk.edu.pl::0899dcc6-7ddc-443b-a5f8-e372dbec5d48" providerId="AD" clId="Web-{92DD319D-B8AE-4DB7-937E-88CCAA9E9A9A}" dt="2024-01-22T19:47:16.029" v="42"/>
-          <ac:spMkLst>
-            <pc:docMk/>
-            <pc:sldMk cId="1445634233" sldId="290"/>
-            <ac:spMk id="30" creationId="{8883B597-C9A1-46EF-AB6B-71DF0B1ED4A6}"/>
-          </ac:spMkLst>
-        </pc:spChg>
-        <pc:spChg chg="add del">
-          <ac:chgData name="Katarzyna Młynarczyk" userId="S::katarzyna.mlynarczyk@student.pk.edu.pl::0899dcc6-7ddc-443b-a5f8-e372dbec5d48" providerId="AD" clId="Web-{92DD319D-B8AE-4DB7-937E-88CCAA9E9A9A}" dt="2024-01-22T19:47:16.029" v="42"/>
-          <ac:spMkLst>
-            <pc:docMk/>
-            <pc:sldMk cId="1445634233" sldId="290"/>
-            <ac:spMk id="31" creationId="{A0B38421-369F-445C-9543-5BC17BC09040}"/>
-          </ac:spMkLst>
-        </pc:spChg>
-        <pc:spChg chg="add del">
-          <ac:chgData name="Katarzyna Młynarczyk" userId="S::katarzyna.mlynarczyk@student.pk.edu.pl::0899dcc6-7ddc-443b-a5f8-e372dbec5d48" providerId="AD" clId="Web-{92DD319D-B8AE-4DB7-937E-88CCAA9E9A9A}" dt="2024-01-22T19:47:16.029" v="42"/>
-          <ac:spMkLst>
-            <pc:docMk/>
-            <pc:sldMk cId="1445634233" sldId="290"/>
-            <ac:spMk id="32" creationId="{FAA9CE81-CAF0-41E3-8E73-CAFA13A0B1A7}"/>
-          </ac:spMkLst>
-        </pc:spChg>
-        <pc:spChg chg="add">
-          <ac:chgData name="Katarzyna Młynarczyk" userId="S::katarzyna.mlynarczyk@student.pk.edu.pl::0899dcc6-7ddc-443b-a5f8-e372dbec5d48" providerId="AD" clId="Web-{92DD319D-B8AE-4DB7-937E-88CCAA9E9A9A}" dt="2024-01-22T19:47:16.044" v="43"/>
-          <ac:spMkLst>
-            <pc:docMk/>
-            <pc:sldMk cId="1445634233" sldId="290"/>
-            <ac:spMk id="34" creationId="{E1750109-3B91-4506-B997-0CD8E35A1488}"/>
-          </ac:spMkLst>
-        </pc:spChg>
-        <pc:spChg chg="add">
-          <ac:chgData name="Katarzyna Młynarczyk" userId="S::katarzyna.mlynarczyk@student.pk.edu.pl::0899dcc6-7ddc-443b-a5f8-e372dbec5d48" providerId="AD" clId="Web-{92DD319D-B8AE-4DB7-937E-88CCAA9E9A9A}" dt="2024-01-22T19:47:16.044" v="43"/>
-          <ac:spMkLst>
-            <pc:docMk/>
-            <pc:sldMk cId="1445634233" sldId="290"/>
-            <ac:spMk id="35" creationId="{E72D8D1B-59F6-4FF3-8547-9BBB6129F2FA}"/>
-          </ac:spMkLst>
-        </pc:spChg>
-        <pc:spChg chg="add">
-          <ac:chgData name="Katarzyna Młynarczyk" userId="S::katarzyna.mlynarczyk@student.pk.edu.pl::0899dcc6-7ddc-443b-a5f8-e372dbec5d48" providerId="AD" clId="Web-{92DD319D-B8AE-4DB7-937E-88CCAA9E9A9A}" dt="2024-01-22T19:47:16.044" v="43"/>
-          <ac:spMkLst>
-            <pc:docMk/>
-            <pc:sldMk cId="1445634233" sldId="290"/>
-            <ac:spMk id="36" creationId="{14044C96-7CFD-44DB-A579-D77B0D37C681}"/>
-          </ac:spMkLst>
-        </pc:spChg>
-        <pc:spChg chg="add">
-          <ac:chgData name="Katarzyna Młynarczyk" userId="S::katarzyna.mlynarczyk@student.pk.edu.pl::0899dcc6-7ddc-443b-a5f8-e372dbec5d48" providerId="AD" clId="Web-{92DD319D-B8AE-4DB7-937E-88CCAA9E9A9A}" dt="2024-01-22T19:47:16.044" v="43"/>
-          <ac:spMkLst>
-            <pc:docMk/>
-            <pc:sldMk cId="1445634233" sldId="290"/>
-            <ac:spMk id="37" creationId="{8FC8C21F-9484-4A71-ABFA-6C10682FAC3E}"/>
-          </ac:spMkLst>
-        </pc:spChg>
-        <pc:spChg chg="add">
-          <ac:chgData name="Katarzyna Młynarczyk" userId="S::katarzyna.mlynarczyk@student.pk.edu.pl::0899dcc6-7ddc-443b-a5f8-e372dbec5d48" providerId="AD" clId="Web-{92DD319D-B8AE-4DB7-937E-88CCAA9E9A9A}" dt="2024-01-22T19:47:16.044" v="43"/>
-          <ac:spMkLst>
-            <pc:docMk/>
-            <pc:sldMk cId="1445634233" sldId="290"/>
-            <ac:spMk id="38" creationId="{2C444748-5A8D-4B53-89FE-42B455DFA2D1}"/>
-          </ac:spMkLst>
-        </pc:spChg>
-        <pc:spChg chg="add">
-          <ac:chgData name="Katarzyna Młynarczyk" userId="S::katarzyna.mlynarczyk@student.pk.edu.pl::0899dcc6-7ddc-443b-a5f8-e372dbec5d48" providerId="AD" clId="Web-{92DD319D-B8AE-4DB7-937E-88CCAA9E9A9A}" dt="2024-01-22T19:47:16.044" v="43"/>
-          <ac:spMkLst>
-            <pc:docMk/>
-            <pc:sldMk cId="1445634233" sldId="290"/>
-            <ac:spMk id="39" creationId="{F4FFA271-A10A-4AC3-8F06-E3313A197A80}"/>
-          </ac:spMkLst>
-        </pc:spChg>
-        <pc:picChg chg="add mod ord">
-          <ac:chgData name="Katarzyna Młynarczyk" userId="S::katarzyna.mlynarczyk@student.pk.edu.pl::0899dcc6-7ddc-443b-a5f8-e372dbec5d48" providerId="AD" clId="Web-{92DD319D-B8AE-4DB7-937E-88CCAA9E9A9A}" dt="2024-01-22T19:47:16.044" v="43"/>
-          <ac:picMkLst>
-            <pc:docMk/>
-            <pc:sldMk cId="1445634233" sldId="290"/>
-            <ac:picMk id="2" creationId="{B60F6EEE-DD99-AC38-692E-D3A0595C755D}"/>
-          </ac:picMkLst>
-        </pc:picChg>
-        <pc:picChg chg="add mod ord">
-          <ac:chgData name="Katarzyna Młynarczyk" userId="S::katarzyna.mlynarczyk@student.pk.edu.pl::0899dcc6-7ddc-443b-a5f8-e372dbec5d48" providerId="AD" clId="Web-{92DD319D-B8AE-4DB7-937E-88CCAA9E9A9A}" dt="2024-01-22T19:47:16.044" v="43"/>
-          <ac:picMkLst>
-            <pc:docMk/>
-            <pc:sldMk cId="1445634233" sldId="290"/>
-            <ac:picMk id="3" creationId="{16DA5DAF-E7EA-EA7A-AD0F-1A9F6CB4BD6B}"/>
-          </ac:picMkLst>
-        </pc:picChg>
-        <pc:picChg chg="add del mod">
-          <ac:chgData name="Katarzyna Młynarczyk" userId="S::katarzyna.mlynarczyk@student.pk.edu.pl::0899dcc6-7ddc-443b-a5f8-e372dbec5d48" providerId="AD" clId="Web-{92DD319D-B8AE-4DB7-937E-88CCAA9E9A9A}" dt="2024-01-22T19:43:42.099" v="10"/>
-          <ac:picMkLst>
-            <pc:docMk/>
-            <pc:sldMk cId="1445634233" sldId="290"/>
-            <ac:picMk id="4" creationId="{42A75CE3-A3AB-0516-BA84-3EEF7962F68D}"/>
-          </ac:picMkLst>
-        </pc:picChg>
-        <pc:picChg chg="add del mod">
-          <ac:chgData name="Katarzyna Młynarczyk" userId="S::katarzyna.mlynarczyk@student.pk.edu.pl::0899dcc6-7ddc-443b-a5f8-e372dbec5d48" providerId="AD" clId="Web-{92DD319D-B8AE-4DB7-937E-88CCAA9E9A9A}" dt="2024-01-22T19:43:58.787" v="12"/>
-          <ac:picMkLst>
-            <pc:docMk/>
-            <pc:sldMk cId="1445634233" sldId="290"/>
-            <ac:picMk id="5" creationId="{216DA0F2-DEB3-6B0D-B50C-B1F71DE956E6}"/>
-          </ac:picMkLst>
-        </pc:picChg>
-        <pc:picChg chg="add mod ord">
-          <ac:chgData name="Katarzyna Młynarczyk" userId="S::katarzyna.mlynarczyk@student.pk.edu.pl::0899dcc6-7ddc-443b-a5f8-e372dbec5d48" providerId="AD" clId="Web-{92DD319D-B8AE-4DB7-937E-88CCAA9E9A9A}" dt="2024-01-22T19:47:16.044" v="43"/>
-          <ac:picMkLst>
-            <pc:docMk/>
-            <pc:sldMk cId="1445634233" sldId="290"/>
-            <ac:picMk id="6" creationId="{7A11C06B-4FF4-6CF9-6D9E-6BE6C40F4D44}"/>
-          </ac:picMkLst>
-        </pc:picChg>
-        <pc:picChg chg="add del mod">
-          <ac:chgData name="Katarzyna Młynarczyk" userId="S::katarzyna.mlynarczyk@student.pk.edu.pl::0899dcc6-7ddc-443b-a5f8-e372dbec5d48" providerId="AD" clId="Web-{92DD319D-B8AE-4DB7-937E-88CCAA9E9A9A}" dt="2024-01-22T19:45:18.243" v="23"/>
-          <ac:picMkLst>
-            <pc:docMk/>
-            <pc:sldMk cId="1445634233" sldId="290"/>
-            <ac:picMk id="7" creationId="{32930C75-8BC8-47B7-F5F5-5232530D6FC1}"/>
-          </ac:picMkLst>
-        </pc:picChg>
-        <pc:picChg chg="add mod">
-          <ac:chgData name="Katarzyna Młynarczyk" userId="S::katarzyna.mlynarczyk@student.pk.edu.pl::0899dcc6-7ddc-443b-a5f8-e372dbec5d48" providerId="AD" clId="Web-{92DD319D-B8AE-4DB7-937E-88CCAA9E9A9A}" dt="2024-01-22T19:47:16.044" v="43"/>
-          <ac:picMkLst>
-            <pc:docMk/>
-            <pc:sldMk cId="1445634233" sldId="290"/>
-            <ac:picMk id="8" creationId="{EA3F951F-90C2-F506-12A7-2BC3A44FD0DE}"/>
-          </ac:picMkLst>
-        </pc:picChg>
-        <pc:picChg chg="add del mod">
-          <ac:chgData name="Katarzyna Młynarczyk" userId="S::katarzyna.mlynarczyk@student.pk.edu.pl::0899dcc6-7ddc-443b-a5f8-e372dbec5d48" providerId="AD" clId="Web-{92DD319D-B8AE-4DB7-937E-88CCAA9E9A9A}" dt="2024-01-22T19:46:21.636" v="28"/>
-          <ac:picMkLst>
-            <pc:docMk/>
-            <pc:sldMk cId="1445634233" sldId="290"/>
-            <ac:picMk id="9" creationId="{CD6BB69C-795B-65EB-5AC2-38F3A051D426}"/>
-          </ac:picMkLst>
-        </pc:picChg>
-        <pc:picChg chg="add del mod">
-          <ac:chgData name="Katarzyna Młynarczyk" userId="S::katarzyna.mlynarczyk@student.pk.edu.pl::0899dcc6-7ddc-443b-a5f8-e372dbec5d48" providerId="AD" clId="Web-{92DD319D-B8AE-4DB7-937E-88CCAA9E9A9A}" dt="2024-01-22T19:46:29.089" v="33"/>
-          <ac:picMkLst>
-            <pc:docMk/>
-            <pc:sldMk cId="1445634233" sldId="290"/>
-            <ac:picMk id="10" creationId="{0E174444-85D7-1F0B-CFF0-8E43EC1619D2}"/>
-          </ac:picMkLst>
-        </pc:picChg>
-        <pc:picChg chg="add mod">
-          <ac:chgData name="Katarzyna Młynarczyk" userId="S::katarzyna.mlynarczyk@student.pk.edu.pl::0899dcc6-7ddc-443b-a5f8-e372dbec5d48" providerId="AD" clId="Web-{92DD319D-B8AE-4DB7-937E-88CCAA9E9A9A}" dt="2024-01-22T19:47:16.044" v="43"/>
-          <ac:picMkLst>
-            <pc:docMk/>
-            <pc:sldMk cId="1445634233" sldId="290"/>
-            <ac:picMk id="11" creationId="{68D66FDA-5B0F-A009-485B-0E02BE84E648}"/>
-          </ac:picMkLst>
-        </pc:picChg>
-      </pc:sldChg>
-      <pc:sldChg chg="addSp delSp modSp">
-        <pc:chgData name="Katarzyna Młynarczyk" userId="S::katarzyna.mlynarczyk@student.pk.edu.pl::0899dcc6-7ddc-443b-a5f8-e372dbec5d48" providerId="AD" clId="Web-{92DD319D-B8AE-4DB7-937E-88CCAA9E9A9A}" dt="2024-01-22T22:00:10.978" v="107" actId="1076"/>
-        <pc:sldMkLst>
-          <pc:docMk/>
-          <pc:sldMk cId="1409292011" sldId="291"/>
-        </pc:sldMkLst>
-        <pc:spChg chg="add del mod">
-          <ac:chgData name="Katarzyna Młynarczyk" userId="S::katarzyna.mlynarczyk@student.pk.edu.pl::0899dcc6-7ddc-443b-a5f8-e372dbec5d48" providerId="AD" clId="Web-{92DD319D-B8AE-4DB7-937E-88CCAA9E9A9A}" dt="2024-01-22T20:08:34.671" v="105"/>
-          <ac:spMkLst>
-            <pc:docMk/>
-            <pc:sldMk cId="1409292011" sldId="291"/>
-            <ac:spMk id="4" creationId="{E24FE2A5-23A3-98A4-A21E-D2A770EB4CA6}"/>
-          </ac:spMkLst>
-        </pc:spChg>
-        <pc:picChg chg="add mod">
-          <ac:chgData name="Katarzyna Młynarczyk" userId="S::katarzyna.mlynarczyk@student.pk.edu.pl::0899dcc6-7ddc-443b-a5f8-e372dbec5d48" providerId="AD" clId="Web-{92DD319D-B8AE-4DB7-937E-88CCAA9E9A9A}" dt="2024-01-22T22:00:10.978" v="107" actId="1076"/>
-          <ac:picMkLst>
-            <pc:docMk/>
-            <pc:sldMk cId="1409292011" sldId="291"/>
-            <ac:picMk id="2" creationId="{EC79BA18-A332-CAAF-8773-E9C755BA39F7}"/>
-          </ac:picMkLst>
-        </pc:picChg>
-        <pc:picChg chg="add mod">
-          <ac:chgData name="Katarzyna Młynarczyk" userId="S::katarzyna.mlynarczyk@student.pk.edu.pl::0899dcc6-7ddc-443b-a5f8-e372dbec5d48" providerId="AD" clId="Web-{92DD319D-B8AE-4DB7-937E-88CCAA9E9A9A}" dt="2024-01-22T20:07:58.701" v="94" actId="1076"/>
-          <ac:picMkLst>
-            <pc:docMk/>
-            <pc:sldMk cId="1409292011" sldId="291"/>
-            <ac:picMk id="3" creationId="{8091DC61-F0D6-74D5-C451-E5EE1F626F10}"/>
-          </ac:picMkLst>
-        </pc:picChg>
       </pc:sldChg>
     </pc:docChg>
   </pc:docChgLst>
@@ -3713,7 +3713,7 @@
           <a:p>
             <a:fld id="{C77E68A1-D7B2-4F42-8F04-619CCC6E26FF}" type="datetimeFigureOut">
               <a:rPr lang="pl-PL" smtClean="0"/>
-              <a:t>29.03.2024</a:t>
+              <a:t>04.04.2024</a:t>
             </a:fld>
             <a:endParaRPr lang="pl-PL"/>
           </a:p>
@@ -5465,7 +5465,7 @@
           <a:p>
             <a:fld id="{6BF00120-5FD5-4848-8E9F-274DF4A71269}" type="datetimeFigureOut">
               <a:rPr lang="en-GB" smtClean="0"/>
-              <a:t>29/03/2024</a:t>
+              <a:t>04/04/2024</a:t>
             </a:fld>
             <a:endParaRPr lang="en-GB"/>
           </a:p>
@@ -5633,7 +5633,7 @@
           <a:p>
             <a:fld id="{6BF00120-5FD5-4848-8E9F-274DF4A71269}" type="datetimeFigureOut">
               <a:rPr lang="en-GB" smtClean="0"/>
-              <a:t>29/03/2024</a:t>
+              <a:t>04/04/2024</a:t>
             </a:fld>
             <a:endParaRPr lang="en-GB"/>
           </a:p>
@@ -5811,7 +5811,7 @@
           <a:p>
             <a:fld id="{6BF00120-5FD5-4848-8E9F-274DF4A71269}" type="datetimeFigureOut">
               <a:rPr lang="en-GB" smtClean="0"/>
-              <a:t>29/03/2024</a:t>
+              <a:t>04/04/2024</a:t>
             </a:fld>
             <a:endParaRPr lang="en-GB"/>
           </a:p>
@@ -5979,7 +5979,7 @@
           <a:p>
             <a:fld id="{6BF00120-5FD5-4848-8E9F-274DF4A71269}" type="datetimeFigureOut">
               <a:rPr lang="en-GB" smtClean="0"/>
-              <a:t>29/03/2024</a:t>
+              <a:t>04/04/2024</a:t>
             </a:fld>
             <a:endParaRPr lang="en-GB"/>
           </a:p>
@@ -6224,7 +6224,7 @@
           <a:p>
             <a:fld id="{6BF00120-5FD5-4848-8E9F-274DF4A71269}" type="datetimeFigureOut">
               <a:rPr lang="en-GB" smtClean="0"/>
-              <a:t>29/03/2024</a:t>
+              <a:t>04/04/2024</a:t>
             </a:fld>
             <a:endParaRPr lang="en-GB"/>
           </a:p>
@@ -6453,7 +6453,7 @@
           <a:p>
             <a:fld id="{6BF00120-5FD5-4848-8E9F-274DF4A71269}" type="datetimeFigureOut">
               <a:rPr lang="en-GB" smtClean="0"/>
-              <a:t>29/03/2024</a:t>
+              <a:t>04/04/2024</a:t>
             </a:fld>
             <a:endParaRPr lang="en-GB"/>
           </a:p>
@@ -6817,7 +6817,7 @@
           <a:p>
             <a:fld id="{6BF00120-5FD5-4848-8E9F-274DF4A71269}" type="datetimeFigureOut">
               <a:rPr lang="en-GB" smtClean="0"/>
-              <a:t>29/03/2024</a:t>
+              <a:t>04/04/2024</a:t>
             </a:fld>
             <a:endParaRPr lang="en-GB"/>
           </a:p>
@@ -6934,7 +6934,7 @@
           <a:p>
             <a:fld id="{6BF00120-5FD5-4848-8E9F-274DF4A71269}" type="datetimeFigureOut">
               <a:rPr lang="en-GB" smtClean="0"/>
-              <a:t>29/03/2024</a:t>
+              <a:t>04/04/2024</a:t>
             </a:fld>
             <a:endParaRPr lang="en-GB"/>
           </a:p>
@@ -7029,7 +7029,7 @@
           <a:p>
             <a:fld id="{6BF00120-5FD5-4848-8E9F-274DF4A71269}" type="datetimeFigureOut">
               <a:rPr lang="en-GB" smtClean="0"/>
-              <a:t>29/03/2024</a:t>
+              <a:t>04/04/2024</a:t>
             </a:fld>
             <a:endParaRPr lang="en-GB"/>
           </a:p>
@@ -7304,7 +7304,7 @@
           <a:p>
             <a:fld id="{6BF00120-5FD5-4848-8E9F-274DF4A71269}" type="datetimeFigureOut">
               <a:rPr lang="en-GB" smtClean="0"/>
-              <a:t>29/03/2024</a:t>
+              <a:t>04/04/2024</a:t>
             </a:fld>
             <a:endParaRPr lang="en-GB"/>
           </a:p>
@@ -7559,7 +7559,7 @@
           <a:p>
             <a:fld id="{6BF00120-5FD5-4848-8E9F-274DF4A71269}" type="datetimeFigureOut">
               <a:rPr lang="en-GB" smtClean="0"/>
-              <a:t>29/03/2024</a:t>
+              <a:t>04/04/2024</a:t>
             </a:fld>
             <a:endParaRPr lang="en-GB"/>
           </a:p>
@@ -7770,7 +7770,7 @@
           <a:p>
             <a:fld id="{6BF00120-5FD5-4848-8E9F-274DF4A71269}" type="datetimeFigureOut">
               <a:rPr lang="en-GB" smtClean="0"/>
-              <a:t>29/03/2024</a:t>
+              <a:t>04/04/2024</a:t>
             </a:fld>
             <a:endParaRPr lang="en-GB"/>
           </a:p>

</xml_diff>